<commit_message>
Updated Lec 02, added housing dataset
</commit_message>
<xml_diff>
--- a/Syllabus/Lecture02/Lec02.pptx
+++ b/Syllabus/Lecture02/Lec02.pptx
@@ -38,17 +38,17 @@
     <p:sldId id="351" r:id="rId26"/>
     <p:sldId id="352" r:id="rId27"/>
     <p:sldId id="353" r:id="rId28"/>
-    <p:sldId id="348" r:id="rId29"/>
-    <p:sldId id="330" r:id="rId30"/>
-    <p:sldId id="329" r:id="rId31"/>
-    <p:sldId id="332" r:id="rId32"/>
-    <p:sldId id="333" r:id="rId33"/>
-    <p:sldId id="334" r:id="rId34"/>
-    <p:sldId id="336" r:id="rId35"/>
-    <p:sldId id="337" r:id="rId36"/>
-    <p:sldId id="338" r:id="rId37"/>
-    <p:sldId id="339" r:id="rId38"/>
-    <p:sldId id="340" r:id="rId39"/>
+    <p:sldId id="354" r:id="rId29"/>
+    <p:sldId id="348" r:id="rId30"/>
+    <p:sldId id="330" r:id="rId31"/>
+    <p:sldId id="329" r:id="rId32"/>
+    <p:sldId id="332" r:id="rId33"/>
+    <p:sldId id="333" r:id="rId34"/>
+    <p:sldId id="355" r:id="rId35"/>
+    <p:sldId id="334" r:id="rId36"/>
+    <p:sldId id="336" r:id="rId37"/>
+    <p:sldId id="338" r:id="rId38"/>
+    <p:sldId id="339" r:id="rId39"/>
     <p:sldId id="341" r:id="rId40"/>
     <p:sldId id="343" r:id="rId41"/>
     <p:sldId id="342" r:id="rId42"/>
@@ -184,17 +184,17 @@
             <p14:sldId id="351"/>
             <p14:sldId id="352"/>
             <p14:sldId id="353"/>
+            <p14:sldId id="354"/>
             <p14:sldId id="348"/>
             <p14:sldId id="330"/>
             <p14:sldId id="329"/>
             <p14:sldId id="332"/>
             <p14:sldId id="333"/>
+            <p14:sldId id="355"/>
             <p14:sldId id="334"/>
             <p14:sldId id="336"/>
-            <p14:sldId id="337"/>
             <p14:sldId id="338"/>
             <p14:sldId id="339"/>
-            <p14:sldId id="340"/>
             <p14:sldId id="341"/>
             <p14:sldId id="343"/>
             <p14:sldId id="342"/>
@@ -319,7 +319,7 @@
           <a:p>
             <a:fld id="{DF9C6931-D0F6-AB40-9D7F-95567148A5C2}" type="datetimeFigureOut">
               <a:rPr lang="en-US" smtClean="0"/>
-              <a:t>8/29/22</a:t>
+              <a:t>8/31/22</a:t>
             </a:fld>
             <a:endParaRPr lang="en-US"/>
           </a:p>
@@ -496,7 +496,7 @@
           <a:p>
             <a:fld id="{736C18F2-6801-5147-A332-A6E1C7D69D18}" type="datetimeFigureOut">
               <a:rPr lang="en-US" smtClean="0"/>
-              <a:t>8/29/22</a:t>
+              <a:t>8/31/22</a:t>
             </a:fld>
             <a:endParaRPr lang="en-US"/>
           </a:p>
@@ -2843,14 +2843,22 @@
           </a:bodyPr>
           <a:lstStyle/>
           <a:p>
-            <a:pPr marL="0" lvl="0" indent="0" algn="l" rtl="0">
+            <a:pPr marL="0" marR="0" lvl="0" indent="0" algn="l" defTabSz="609585" rtl="0" eaLnBrk="1" fontAlgn="auto" latinLnBrk="0" hangingPunct="1">
+              <a:lnSpc>
+                <a:spcPct val="100000"/>
+              </a:lnSpc>
               <a:spcBef>
                 <a:spcPts val="0"/>
               </a:spcBef>
               <a:spcAft>
                 <a:spcPts val="0"/>
               </a:spcAft>
+              <a:buClrTx/>
+              <a:buSzTx/>
+              <a:buFontTx/>
               <a:buNone/>
+              <a:tabLst/>
+              <a:defRPr/>
             </a:pPr>
             <a:endParaRPr lang="en-US" dirty="0"/>
           </a:p>
@@ -2859,7 +2867,7 @@
     </p:spTree>
     <p:extLst>
       <p:ext uri="{BB962C8B-B14F-4D97-AF65-F5344CB8AC3E}">
-        <p14:creationId xmlns:p14="http://schemas.microsoft.com/office/powerpoint/2010/main" val="1627882378"/>
+        <p14:creationId xmlns:p14="http://schemas.microsoft.com/office/powerpoint/2010/main" val="3079414395"/>
       </p:ext>
     </p:extLst>
   </p:cSld>
@@ -2968,7 +2976,7 @@
     </p:spTree>
     <p:extLst>
       <p:ext uri="{BB962C8B-B14F-4D97-AF65-F5344CB8AC3E}">
-        <p14:creationId xmlns:p14="http://schemas.microsoft.com/office/powerpoint/2010/main" val="104545633"/>
+        <p14:creationId xmlns:p14="http://schemas.microsoft.com/office/powerpoint/2010/main" val="1627882378"/>
       </p:ext>
     </p:extLst>
   </p:cSld>
@@ -3061,22 +3069,14 @@
           </a:bodyPr>
           <a:lstStyle/>
           <a:p>
-            <a:pPr marL="0" marR="0" lvl="0" indent="0" algn="l" defTabSz="609585" rtl="0" eaLnBrk="1" fontAlgn="auto" latinLnBrk="0" hangingPunct="1">
-              <a:lnSpc>
-                <a:spcPct val="100000"/>
-              </a:lnSpc>
+            <a:pPr marL="0" lvl="0" indent="0" algn="l" rtl="0">
               <a:spcBef>
                 <a:spcPts val="0"/>
               </a:spcBef>
               <a:spcAft>
                 <a:spcPts val="0"/>
               </a:spcAft>
-              <a:buClrTx/>
-              <a:buSzTx/>
-              <a:buFontTx/>
               <a:buNone/>
-              <a:tabLst/>
-              <a:defRPr/>
             </a:pPr>
             <a:endParaRPr lang="en-US" dirty="0"/>
           </a:p>
@@ -3085,7 +3085,7 @@
     </p:spTree>
     <p:extLst>
       <p:ext uri="{BB962C8B-B14F-4D97-AF65-F5344CB8AC3E}">
-        <p14:creationId xmlns:p14="http://schemas.microsoft.com/office/powerpoint/2010/main" val="3935206571"/>
+        <p14:creationId xmlns:p14="http://schemas.microsoft.com/office/powerpoint/2010/main" val="104545633"/>
       </p:ext>
     </p:extLst>
   </p:cSld>
@@ -3202,7 +3202,7 @@
     </p:spTree>
     <p:extLst>
       <p:ext uri="{BB962C8B-B14F-4D97-AF65-F5344CB8AC3E}">
-        <p14:creationId xmlns:p14="http://schemas.microsoft.com/office/powerpoint/2010/main" val="3938340473"/>
+        <p14:creationId xmlns:p14="http://schemas.microsoft.com/office/powerpoint/2010/main" val="3935206571"/>
       </p:ext>
     </p:extLst>
   </p:cSld>
@@ -3431,7 +3431,7 @@
     </p:spTree>
     <p:extLst>
       <p:ext uri="{BB962C8B-B14F-4D97-AF65-F5344CB8AC3E}">
-        <p14:creationId xmlns:p14="http://schemas.microsoft.com/office/powerpoint/2010/main" val="4216157522"/>
+        <p14:creationId xmlns:p14="http://schemas.microsoft.com/office/powerpoint/2010/main" val="3938340473"/>
       </p:ext>
     </p:extLst>
   </p:cSld>
@@ -3548,7 +3548,7 @@
     </p:spTree>
     <p:extLst>
       <p:ext uri="{BB962C8B-B14F-4D97-AF65-F5344CB8AC3E}">
-        <p14:creationId xmlns:p14="http://schemas.microsoft.com/office/powerpoint/2010/main" val="759372625"/>
+        <p14:creationId xmlns:p14="http://schemas.microsoft.com/office/powerpoint/2010/main" val="4216157522"/>
       </p:ext>
     </p:extLst>
   </p:cSld>
@@ -3665,7 +3665,7 @@
     </p:spTree>
     <p:extLst>
       <p:ext uri="{BB962C8B-B14F-4D97-AF65-F5344CB8AC3E}">
-        <p14:creationId xmlns:p14="http://schemas.microsoft.com/office/powerpoint/2010/main" val="1581552090"/>
+        <p14:creationId xmlns:p14="http://schemas.microsoft.com/office/powerpoint/2010/main" val="1569997163"/>
       </p:ext>
     </p:extLst>
   </p:cSld>
@@ -3782,7 +3782,7 @@
     </p:spTree>
     <p:extLst>
       <p:ext uri="{BB962C8B-B14F-4D97-AF65-F5344CB8AC3E}">
-        <p14:creationId xmlns:p14="http://schemas.microsoft.com/office/powerpoint/2010/main" val="1228587899"/>
+        <p14:creationId xmlns:p14="http://schemas.microsoft.com/office/powerpoint/2010/main" val="759372625"/>
       </p:ext>
     </p:extLst>
   </p:cSld>
@@ -3899,7 +3899,7 @@
     </p:spTree>
     <p:extLst>
       <p:ext uri="{BB962C8B-B14F-4D97-AF65-F5344CB8AC3E}">
-        <p14:creationId xmlns:p14="http://schemas.microsoft.com/office/powerpoint/2010/main" val="230335824"/>
+        <p14:creationId xmlns:p14="http://schemas.microsoft.com/office/powerpoint/2010/main" val="1581552090"/>
       </p:ext>
     </p:extLst>
   </p:cSld>
@@ -4016,7 +4016,7 @@
     </p:spTree>
     <p:extLst>
       <p:ext uri="{BB962C8B-B14F-4D97-AF65-F5344CB8AC3E}">
-        <p14:creationId xmlns:p14="http://schemas.microsoft.com/office/powerpoint/2010/main" val="2918353796"/>
+        <p14:creationId xmlns:p14="http://schemas.microsoft.com/office/powerpoint/2010/main" val="230335824"/>
       </p:ext>
     </p:extLst>
   </p:cSld>
@@ -4133,7 +4133,7 @@
     </p:spTree>
     <p:extLst>
       <p:ext uri="{BB962C8B-B14F-4D97-AF65-F5344CB8AC3E}">
-        <p14:creationId xmlns:p14="http://schemas.microsoft.com/office/powerpoint/2010/main" val="2110576029"/>
+        <p14:creationId xmlns:p14="http://schemas.microsoft.com/office/powerpoint/2010/main" val="2918353796"/>
       </p:ext>
     </p:extLst>
   </p:cSld>
@@ -20730,8 +20730,8 @@
         </p:nvSpPr>
         <p:spPr>
           <a:xfrm>
-            <a:off x="311422" y="812930"/>
-            <a:ext cx="11277600" cy="5042664"/>
+            <a:off x="261621" y="1066326"/>
+            <a:ext cx="11277600" cy="741009"/>
           </a:xfrm>
           <a:prstGeom prst="rect">
             <a:avLst/>
@@ -20747,10 +20747,59 @@
           </a:bodyPr>
           <a:lstStyle/>
           <a:p>
-            <a:pPr marL="101598">
+            <a:pPr marL="444498" indent="-342900">
               <a:buSzPct val="100000"/>
-            </a:pPr>
-            <a:endParaRPr lang="en-US" sz="2000" dirty="0"/>
+              <a:buFont typeface="Arial" panose="020B0604020202020204" pitchFamily="34" charset="0"/>
+              <a:buChar char="•"/>
+            </a:pPr>
+            <a:r>
+              <a:rPr lang="en-US" sz="2000" dirty="0"/>
+              <a:t>Example: Does money makes people happy?</a:t>
+            </a:r>
+          </a:p>
+          <a:p>
+            <a:pPr marL="1054083" lvl="1" indent="-342900">
+              <a:buSzPct val="100000"/>
+              <a:buFont typeface="Arial" panose="020B0604020202020204" pitchFamily="34" charset="0"/>
+              <a:buChar char="•"/>
+            </a:pPr>
+            <a:r>
+              <a:rPr lang="en-US" sz="2000" dirty="0"/>
+              <a:t>Download </a:t>
+            </a:r>
+          </a:p>
+          <a:p>
+            <a:pPr marL="1663668" lvl="2" indent="-342900">
+              <a:buSzPct val="100000"/>
+              <a:buFont typeface="Arial" panose="020B0604020202020204" pitchFamily="34" charset="0"/>
+              <a:buChar char="•"/>
+            </a:pPr>
+            <a:r>
+              <a:rPr lang="en-US" sz="2000" dirty="0"/>
+              <a:t>“Better Life Index” data from the OECD’s website </a:t>
+            </a:r>
+          </a:p>
+          <a:p>
+            <a:pPr marL="1663668" lvl="2" indent="-342900">
+              <a:buSzPct val="100000"/>
+              <a:buFont typeface="Arial" panose="020B0604020202020204" pitchFamily="34" charset="0"/>
+              <a:buChar char="•"/>
+            </a:pPr>
+            <a:r>
+              <a:rPr lang="en-US" sz="2000" dirty="0"/>
+              <a:t>GDP per capita from the IMF’s website. </a:t>
+            </a:r>
+          </a:p>
+          <a:p>
+            <a:pPr marL="1054083" lvl="1" indent="-342900">
+              <a:buSzPct val="100000"/>
+              <a:buFont typeface="Arial" panose="020B0604020202020204" pitchFamily="34" charset="0"/>
+              <a:buChar char="•"/>
+            </a:pPr>
+            <a:r>
+              <a:rPr lang="en-US" sz="2000" dirty="0"/>
+              <a:t>Plot the data for a few random countries</a:t>
+            </a:r>
           </a:p>
           <a:p>
             <a:pPr marL="609585" indent="-507987">
@@ -20759,157 +20808,74 @@
             </a:pPr>
             <a:endParaRPr lang="en-US" sz="2000" dirty="0"/>
           </a:p>
-          <a:p>
-            <a:pPr marL="609585" indent="-507987">
-              <a:buSzPct val="100000"/>
-              <a:buChar char="●"/>
-            </a:pPr>
-            <a:r>
-              <a:rPr lang="en-US" sz="2000" dirty="0" err="1"/>
-              <a:t>life_satisfaction</a:t>
-            </a:r>
-            <a:r>
-              <a:rPr lang="en-US" sz="2000" dirty="0"/>
-              <a:t> = </a:t>
-            </a:r>
-            <a:r>
-              <a:rPr lang="en-US" sz="2000" i="1" dirty="0"/>
-              <a:t>θ</a:t>
-            </a:r>
-            <a:r>
-              <a:rPr lang="en-US" sz="2000" i="1" baseline="-25000" dirty="0"/>
-              <a:t>0 + </a:t>
-            </a:r>
-            <a:r>
-              <a:rPr lang="en-US" sz="2000" i="1" dirty="0"/>
-              <a:t>θ</a:t>
-            </a:r>
-            <a:r>
-              <a:rPr lang="en-US" sz="2000" i="1" baseline="-25000" dirty="0"/>
-              <a:t>1</a:t>
-            </a:r>
-            <a:r>
-              <a:rPr lang="en-US" sz="2000" i="1" dirty="0"/>
-              <a:t> x </a:t>
-            </a:r>
-            <a:r>
-              <a:rPr lang="en-US" sz="2000" i="1" dirty="0" err="1"/>
-              <a:t>GDP_per_capita</a:t>
-            </a:r>
-            <a:endParaRPr lang="en-US" sz="2000" i="1" dirty="0"/>
-          </a:p>
-          <a:p>
-            <a:pPr marL="609585" indent="-507987">
-              <a:buSzPct val="100000"/>
-              <a:buChar char="●"/>
-            </a:pPr>
-            <a:endParaRPr lang="en-US" sz="2000" dirty="0"/>
-          </a:p>
-          <a:p>
-            <a:pPr marL="609585" indent="-507987">
-              <a:buSzPct val="100000"/>
-              <a:buChar char="●"/>
-            </a:pPr>
-            <a:r>
-              <a:rPr lang="en-US" sz="2000" dirty="0"/>
-              <a:t>two model parameters, </a:t>
-            </a:r>
-            <a:r>
-              <a:rPr lang="en-US" sz="2000" i="1" dirty="0"/>
-              <a:t>θ</a:t>
-            </a:r>
-            <a:r>
-              <a:rPr lang="en-US" sz="2000" i="1" baseline="-25000" dirty="0"/>
-              <a:t>0</a:t>
-            </a:r>
-            <a:r>
-              <a:rPr lang="en-US" sz="2000" dirty="0"/>
-              <a:t> and </a:t>
-            </a:r>
-            <a:r>
-              <a:rPr lang="en-US" sz="2000" i="1" dirty="0"/>
-              <a:t>θ</a:t>
-            </a:r>
-            <a:r>
-              <a:rPr lang="en-US" sz="2000" i="1" baseline="-25000" dirty="0"/>
-              <a:t>1</a:t>
-            </a:r>
-            <a:r>
-              <a:rPr lang="en-US" sz="2000" i="1" dirty="0"/>
-              <a:t>; </a:t>
-            </a:r>
-            <a:r>
-              <a:rPr lang="en-US" sz="2000" dirty="0"/>
-              <a:t>tweaking them to make your model represent any linear function.</a:t>
-            </a:r>
-          </a:p>
-          <a:p>
-            <a:pPr marL="609585" indent="-507987">
-              <a:buSzPct val="100000"/>
-              <a:buChar char="●"/>
-            </a:pPr>
-            <a:endParaRPr lang="en-US" sz="2000" dirty="0"/>
-          </a:p>
-          <a:p>
-            <a:pPr marL="609585" indent="-507987">
-              <a:buSzPct val="100000"/>
-              <a:buChar char="●"/>
-            </a:pPr>
-            <a:r>
-              <a:rPr lang="en-US" sz="2000" u="sng" dirty="0"/>
-              <a:t>Before</a:t>
-            </a:r>
-            <a:r>
-              <a:rPr lang="en-US" sz="2000" dirty="0"/>
-              <a:t> you use your linear model, you need to define the parameter values of </a:t>
-            </a:r>
-            <a:r>
-              <a:rPr lang="en-US" sz="2000" i="1" dirty="0"/>
-              <a:t>θ</a:t>
-            </a:r>
-            <a:r>
-              <a:rPr lang="en-US" sz="2000" i="1" baseline="-25000" dirty="0"/>
-              <a:t>0</a:t>
-            </a:r>
-            <a:r>
-              <a:rPr lang="en-US" sz="2000" i="1" dirty="0"/>
-              <a:t> </a:t>
-            </a:r>
-            <a:r>
-              <a:rPr lang="en-US" sz="2000" dirty="0"/>
-              <a:t>and</a:t>
-            </a:r>
-            <a:r>
-              <a:rPr lang="en-US" sz="2000" i="1" baseline="-25000" dirty="0"/>
-              <a:t> </a:t>
-            </a:r>
-            <a:r>
-              <a:rPr lang="en-US" sz="2000" i="1" dirty="0"/>
-              <a:t>θ</a:t>
-            </a:r>
-            <a:r>
-              <a:rPr lang="en-US" sz="2000" i="1" baseline="-25000" dirty="0"/>
-              <a:t>1.</a:t>
-            </a:r>
-          </a:p>
-          <a:p>
-            <a:pPr marL="1219170" lvl="1" indent="-507987">
-              <a:buSzPct val="100000"/>
-              <a:buChar char="●"/>
-            </a:pPr>
-            <a:r>
-              <a:rPr lang="en-US" sz="2000" dirty="0"/>
-              <a:t>those that make your model perform best</a:t>
-            </a:r>
-          </a:p>
         </p:txBody>
       </p:sp>
+      <p:pic>
+        <p:nvPicPr>
+          <p:cNvPr id="4" name="Picture 3">
+            <a:extLst>
+              <a:ext uri="{FF2B5EF4-FFF2-40B4-BE49-F238E27FC236}">
+                <a16:creationId xmlns:a16="http://schemas.microsoft.com/office/drawing/2014/main" id="{60B38C88-E0BE-4C55-B635-E8A900C9B2ED}"/>
+              </a:ext>
+            </a:extLst>
+          </p:cNvPr>
+          <p:cNvPicPr>
+            <a:picLocks noChangeAspect="1"/>
+          </p:cNvPicPr>
+          <p:nvPr/>
+        </p:nvPicPr>
+        <p:blipFill>
+          <a:blip r:embed="rId3"/>
+          <a:stretch>
+            <a:fillRect/>
+          </a:stretch>
+        </p:blipFill>
+        <p:spPr>
+          <a:xfrm>
+            <a:off x="8157998" y="1344714"/>
+            <a:ext cx="3240046" cy="1727273"/>
+          </a:xfrm>
+          <a:prstGeom prst="rect">
+            <a:avLst/>
+          </a:prstGeom>
+        </p:spPr>
+      </p:pic>
+      <p:pic>
+        <p:nvPicPr>
+          <p:cNvPr id="5" name="Picture 4">
+            <a:extLst>
+              <a:ext uri="{FF2B5EF4-FFF2-40B4-BE49-F238E27FC236}">
+                <a16:creationId xmlns:a16="http://schemas.microsoft.com/office/drawing/2014/main" id="{01344AFE-8459-4DB9-8E92-1A3336B39BC1}"/>
+              </a:ext>
+            </a:extLst>
+          </p:cNvPr>
+          <p:cNvPicPr>
+            <a:picLocks noChangeAspect="1"/>
+          </p:cNvPicPr>
+          <p:nvPr/>
+        </p:nvPicPr>
+        <p:blipFill>
+          <a:blip r:embed="rId4"/>
+          <a:stretch>
+            <a:fillRect/>
+          </a:stretch>
+        </p:blipFill>
+        <p:spPr>
+          <a:xfrm>
+            <a:off x="3579111" y="3429000"/>
+            <a:ext cx="3612865" cy="2004280"/>
+          </a:xfrm>
+          <a:prstGeom prst="rect">
+            <a:avLst/>
+          </a:prstGeom>
+        </p:spPr>
+      </p:pic>
       <p:sp>
         <p:nvSpPr>
-          <p:cNvPr id="3" name="TextBox 2">
+          <p:cNvPr id="6" name="TextBox 5">
             <a:extLst>
               <a:ext uri="{FF2B5EF4-FFF2-40B4-BE49-F238E27FC236}">
-                <a16:creationId xmlns:a16="http://schemas.microsoft.com/office/drawing/2014/main" id="{8336C952-2ED4-4267-88C4-A6FF51E45930}"/>
+                <a16:creationId xmlns:a16="http://schemas.microsoft.com/office/drawing/2014/main" id="{9F3F8E88-98A6-499B-ABE5-694F5B6D6A31}"/>
               </a:ext>
             </a:extLst>
           </p:cNvPr>
@@ -20918,48 +20884,26 @@
         </p:nvSpPr>
         <p:spPr>
           <a:xfrm>
-            <a:off x="1056068" y="4336234"/>
-            <a:ext cx="9882388" cy="1200329"/>
+            <a:off x="7937029" y="4331116"/>
+            <a:ext cx="3112145" cy="707886"/>
           </a:xfrm>
           <a:prstGeom prst="rect">
             <a:avLst/>
           </a:prstGeom>
-          <a:noFill/>
-          <a:ln>
-            <a:solidFill>
-              <a:srgbClr val="E46102"/>
-            </a:solidFill>
-          </a:ln>
+          <a:solidFill>
+            <a:srgbClr val="E46102"/>
+          </a:solidFill>
         </p:spPr>
         <p:txBody>
-          <a:bodyPr wrap="square" rtlCol="0">
+          <a:bodyPr wrap="square" rtlCol="0" anchor="ctr">
             <a:spAutoFit/>
           </a:bodyPr>
           <a:lstStyle/>
           <a:p>
             <a:pPr algn="ctr"/>
             <a:r>
-              <a:rPr lang="en-US" b="1" dirty="0"/>
-              <a:t>Utility Function</a:t>
-            </a:r>
-            <a:r>
-              <a:rPr lang="en-US" dirty="0"/>
-              <a:t> – measures how good your model is</a:t>
-            </a:r>
-          </a:p>
-          <a:p>
-            <a:pPr algn="ctr"/>
-            <a:endParaRPr lang="en-US" dirty="0"/>
-          </a:p>
-          <a:p>
-            <a:pPr algn="ctr"/>
-            <a:r>
-              <a:rPr lang="en-US" b="1" dirty="0"/>
-              <a:t>Cost Function</a:t>
-            </a:r>
-            <a:r>
-              <a:rPr lang="en-US" dirty="0"/>
-              <a:t> – measures how bad your model is</a:t>
+              <a:rPr lang="en-US" sz="2000" b="1" dirty="0"/>
+              <a:t>Model Selection – Linear Model</a:t>
             </a:r>
           </a:p>
         </p:txBody>
@@ -20967,7 +20911,7 @@
     </p:spTree>
     <p:extLst>
       <p:ext uri="{BB962C8B-B14F-4D97-AF65-F5344CB8AC3E}">
-        <p14:creationId xmlns:p14="http://schemas.microsoft.com/office/powerpoint/2010/main" val="1471025527"/>
+        <p14:creationId xmlns:p14="http://schemas.microsoft.com/office/powerpoint/2010/main" val="185618136"/>
       </p:ext>
     </p:extLst>
   </p:cSld>
@@ -21025,7 +20969,7 @@
                   <a:srgbClr val="E46102"/>
                 </a:solidFill>
               </a:rPr>
-              <a:t>Linear Regression Model</a:t>
+              <a:t>Simple Linear Model</a:t>
             </a:r>
             <a:endParaRPr sz="4000" b="1" dirty="0">
               <a:solidFill>
@@ -21043,7 +20987,7 @@
         </p:nvSpPr>
         <p:spPr>
           <a:xfrm>
-            <a:off x="242735" y="851566"/>
+            <a:off x="311422" y="812930"/>
             <a:ext cx="11277600" cy="5042664"/>
           </a:xfrm>
           <a:prstGeom prst="rect">
@@ -21070,26 +21014,100 @@
               <a:buSzPct val="100000"/>
               <a:buChar char="●"/>
             </a:pPr>
-            <a:r>
-              <a:rPr lang="en-US" sz="2000" dirty="0"/>
-              <a:t>Cost Function : measures the distance between the linear model’s predictions and the training examples; the objective is to minimize this distance.</a:t>
-            </a:r>
+            <a:endParaRPr lang="en-US" sz="2000" dirty="0"/>
           </a:p>
           <a:p>
             <a:pPr marL="609585" indent="-507987">
               <a:buSzPct val="100000"/>
               <a:buChar char="●"/>
             </a:pPr>
-            <a:endParaRPr lang="en-US" sz="2000" dirty="0"/>
+            <a:r>
+              <a:rPr lang="en-US" sz="2000" dirty="0"/>
+              <a:t>A linear model for Life satisfaction:</a:t>
+            </a:r>
+          </a:p>
+          <a:p>
+            <a:pPr marL="711183" lvl="1">
+              <a:buSzPct val="100000"/>
+            </a:pPr>
+            <a:r>
+              <a:rPr lang="en-US" sz="2000" dirty="0" err="1"/>
+              <a:t>life_satisfaction</a:t>
+            </a:r>
+            <a:r>
+              <a:rPr lang="en-US" sz="2000" dirty="0"/>
+              <a:t> = </a:t>
+            </a:r>
+            <a:r>
+              <a:rPr lang="en-US" sz="2000" i="1" dirty="0"/>
+              <a:t>θ</a:t>
+            </a:r>
+            <a:r>
+              <a:rPr lang="en-US" sz="2000" i="1" baseline="-25000" dirty="0"/>
+              <a:t>0 + </a:t>
+            </a:r>
+            <a:r>
+              <a:rPr lang="en-US" sz="2000" i="1" dirty="0"/>
+              <a:t>θ</a:t>
+            </a:r>
+            <a:r>
+              <a:rPr lang="en-US" sz="2000" i="1" baseline="-25000" dirty="0"/>
+              <a:t>1</a:t>
+            </a:r>
+            <a:r>
+              <a:rPr lang="en-US" sz="2000" i="1" dirty="0"/>
+              <a:t> x </a:t>
+            </a:r>
+            <a:r>
+              <a:rPr lang="en-US" sz="2000" i="1" dirty="0" err="1"/>
+              <a:t>GDP_per_capita</a:t>
+            </a:r>
+            <a:endParaRPr lang="en-US" sz="2000" i="1" dirty="0"/>
           </a:p>
           <a:p>
             <a:pPr marL="609585" indent="-507987">
               <a:buSzPct val="100000"/>
               <a:buChar char="●"/>
             </a:pPr>
+            <a:endParaRPr lang="en-US" sz="2000" dirty="0"/>
+          </a:p>
+          <a:p>
+            <a:pPr marL="101598">
+              <a:buSzPct val="100000"/>
+            </a:pPr>
             <a:r>
               <a:rPr lang="en-US" sz="2000" dirty="0"/>
-              <a:t>Model Training: Input your training data to a LR model, and it will find the parameters that make the model fit best to your data.</a:t>
+              <a:t>	where, the two model parameters are, </a:t>
+            </a:r>
+            <a:r>
+              <a:rPr lang="en-US" sz="2000" i="1" dirty="0"/>
+              <a:t>θ</a:t>
+            </a:r>
+            <a:r>
+              <a:rPr lang="en-US" sz="2000" i="1" baseline="-25000" dirty="0"/>
+              <a:t>0</a:t>
+            </a:r>
+            <a:r>
+              <a:rPr lang="en-US" sz="2000" dirty="0"/>
+              <a:t> and </a:t>
+            </a:r>
+            <a:r>
+              <a:rPr lang="en-US" sz="2000" i="1" dirty="0"/>
+              <a:t>θ</a:t>
+            </a:r>
+            <a:r>
+              <a:rPr lang="en-US" sz="2000" i="1" baseline="-25000" dirty="0"/>
+              <a:t>1</a:t>
+            </a:r>
+            <a:endParaRPr lang="en-US" sz="2000" i="1" dirty="0"/>
+          </a:p>
+          <a:p>
+            <a:pPr marL="101598">
+              <a:buSzPct val="100000"/>
+            </a:pPr>
+            <a:r>
+              <a:rPr lang="en-US" sz="2000" dirty="0"/>
+              <a:t>		, tweak them to make your model represent any linear function.</a:t>
             </a:r>
           </a:p>
           <a:p>
@@ -21105,15 +21123,111 @@
               <a:buChar char="●"/>
             </a:pPr>
             <a:r>
+              <a:rPr lang="en-US" sz="2000" u="sng" dirty="0"/>
+              <a:t>Before you use your linear model, </a:t>
+            </a:r>
+            <a:r>
               <a:rPr lang="en-US" sz="2000" dirty="0"/>
-              <a:t>In the figure, model fits the training data closely</a:t>
-            </a:r>
-          </a:p>
-          <a:p>
-            <a:pPr marL="101598">
+              <a:t>you need to define the parameter values of </a:t>
+            </a:r>
+            <a:r>
+              <a:rPr lang="en-US" sz="2000" i="1" dirty="0"/>
+              <a:t>θ</a:t>
+            </a:r>
+            <a:r>
+              <a:rPr lang="en-US" sz="2000" i="1" baseline="-25000" dirty="0"/>
+              <a:t>0</a:t>
+            </a:r>
+            <a:r>
+              <a:rPr lang="en-US" sz="2000" i="1" dirty="0"/>
+              <a:t> </a:t>
+            </a:r>
+            <a:r>
+              <a:rPr lang="en-US" sz="2000" dirty="0"/>
+              <a:t>and</a:t>
+            </a:r>
+            <a:r>
+              <a:rPr lang="en-US" sz="2000" i="1" baseline="-25000" dirty="0"/>
+              <a:t> </a:t>
+            </a:r>
+            <a:r>
+              <a:rPr lang="en-US" sz="2000" i="1" dirty="0"/>
+              <a:t>θ</a:t>
+            </a:r>
+            <a:r>
+              <a:rPr lang="en-US" sz="2000" i="1" baseline="-25000" dirty="0"/>
+              <a:t>1.</a:t>
+            </a:r>
+          </a:p>
+          <a:p>
+            <a:pPr marL="1219170" lvl="1" indent="-507987">
               <a:buSzPct val="100000"/>
-            </a:pPr>
-            <a:endParaRPr lang="en-US" sz="2000" dirty="0"/>
+              <a:buChar char="●"/>
+            </a:pPr>
+            <a:r>
+              <a:rPr lang="en-US" sz="2000" dirty="0"/>
+              <a:t>those that make your model perform best</a:t>
+            </a:r>
+          </a:p>
+        </p:txBody>
+      </p:sp>
+      <p:sp>
+        <p:nvSpPr>
+          <p:cNvPr id="3" name="TextBox 2">
+            <a:extLst>
+              <a:ext uri="{FF2B5EF4-FFF2-40B4-BE49-F238E27FC236}">
+                <a16:creationId xmlns:a16="http://schemas.microsoft.com/office/drawing/2014/main" id="{8336C952-2ED4-4267-88C4-A6FF51E45930}"/>
+              </a:ext>
+            </a:extLst>
+          </p:cNvPr>
+          <p:cNvSpPr txBox="1"/>
+          <p:nvPr/>
+        </p:nvSpPr>
+        <p:spPr>
+          <a:xfrm>
+            <a:off x="1056068" y="4336234"/>
+            <a:ext cx="9882388" cy="1200329"/>
+          </a:xfrm>
+          <a:prstGeom prst="rect">
+            <a:avLst/>
+          </a:prstGeom>
+          <a:noFill/>
+          <a:ln>
+            <a:solidFill>
+              <a:srgbClr val="E46102"/>
+            </a:solidFill>
+          </a:ln>
+        </p:spPr>
+        <p:txBody>
+          <a:bodyPr wrap="square" rtlCol="0">
+            <a:spAutoFit/>
+          </a:bodyPr>
+          <a:lstStyle/>
+          <a:p>
+            <a:pPr algn="ctr"/>
+            <a:r>
+              <a:rPr lang="en-US" b="1" dirty="0"/>
+              <a:t>Utility Function</a:t>
+            </a:r>
+            <a:r>
+              <a:rPr lang="en-US" dirty="0"/>
+              <a:t> – measures how good your model is</a:t>
+            </a:r>
+          </a:p>
+          <a:p>
+            <a:pPr algn="ctr"/>
+            <a:endParaRPr lang="en-US" dirty="0"/>
+          </a:p>
+          <a:p>
+            <a:pPr algn="ctr"/>
+            <a:r>
+              <a:rPr lang="en-US" b="1" dirty="0"/>
+              <a:t>Cost Function</a:t>
+            </a:r>
+            <a:r>
+              <a:rPr lang="en-US" dirty="0"/>
+              <a:t> – measures how bad your model is</a:t>
+            </a:r>
           </a:p>
         </p:txBody>
       </p:sp>
@@ -21122,7 +21236,7 @@
           <p:cNvPr id="2" name="Picture 1">
             <a:extLst>
               <a:ext uri="{FF2B5EF4-FFF2-40B4-BE49-F238E27FC236}">
-                <a16:creationId xmlns:a16="http://schemas.microsoft.com/office/drawing/2014/main" id="{BC2C8278-7422-4D2B-9F00-4537AB0686AE}"/>
+                <a16:creationId xmlns:a16="http://schemas.microsoft.com/office/drawing/2014/main" id="{451FF91E-8153-17F0-92DC-911F7B4C6D36}"/>
               </a:ext>
             </a:extLst>
           </p:cNvPr>
@@ -21139,277 +21253,24 @@
         </p:blipFill>
         <p:spPr>
           <a:xfrm>
-            <a:off x="7267799" y="2633073"/>
-            <a:ext cx="4195138" cy="2355343"/>
+            <a:off x="8579135" y="1066326"/>
+            <a:ext cx="3612865" cy="2004280"/>
           </a:xfrm>
           <a:prstGeom prst="rect">
             <a:avLst/>
           </a:prstGeom>
         </p:spPr>
       </p:pic>
-      <p:sp>
-        <p:nvSpPr>
-          <p:cNvPr id="4" name="TextBox 3">
-            <a:extLst>
-              <a:ext uri="{FF2B5EF4-FFF2-40B4-BE49-F238E27FC236}">
-                <a16:creationId xmlns:a16="http://schemas.microsoft.com/office/drawing/2014/main" id="{9A8D91BB-55C7-4831-A05A-19338F66FB78}"/>
-              </a:ext>
-            </a:extLst>
-          </p:cNvPr>
-          <p:cNvSpPr txBox="1"/>
-          <p:nvPr/>
-        </p:nvSpPr>
-        <p:spPr>
-          <a:xfrm>
-            <a:off x="7426205" y="4988416"/>
-            <a:ext cx="4065431" cy="307777"/>
-          </a:xfrm>
-          <a:prstGeom prst="rect">
-            <a:avLst/>
-          </a:prstGeom>
-          <a:noFill/>
-        </p:spPr>
-        <p:txBody>
-          <a:bodyPr wrap="square" rtlCol="0">
-            <a:spAutoFit/>
-          </a:bodyPr>
-          <a:lstStyle/>
-          <a:p>
-            <a:pPr algn="ctr"/>
-            <a:r>
-              <a:rPr lang="en-US" sz="1400" i="1" dirty="0">
-                <a:solidFill>
-                  <a:srgbClr val="E46102"/>
-                </a:solidFill>
-              </a:rPr>
-              <a:t>Linear model that fits the training data best</a:t>
-            </a:r>
-          </a:p>
-        </p:txBody>
-      </p:sp>
     </p:spTree>
     <p:extLst>
       <p:ext uri="{BB962C8B-B14F-4D97-AF65-F5344CB8AC3E}">
-        <p14:creationId xmlns:p14="http://schemas.microsoft.com/office/powerpoint/2010/main" val="436401338"/>
+        <p14:creationId xmlns:p14="http://schemas.microsoft.com/office/powerpoint/2010/main" val="1471025527"/>
       </p:ext>
     </p:extLst>
   </p:cSld>
   <p:clrMapOvr>
     <a:masterClrMapping/>
   </p:clrMapOvr>
-  <p:timing>
-    <p:tnLst>
-      <p:par>
-        <p:cTn id="1" dur="indefinite" restart="never" nodeType="tmRoot">
-          <p:childTnLst>
-            <p:seq concurrent="1" nextAc="seek">
-              <p:cTn id="2" dur="indefinite" nodeType="mainSeq">
-                <p:childTnLst>
-                  <p:par>
-                    <p:cTn id="3" fill="hold">
-                      <p:stCondLst>
-                        <p:cond delay="indefinite"/>
-                      </p:stCondLst>
-                      <p:childTnLst>
-                        <p:par>
-                          <p:cTn id="4" fill="hold">
-                            <p:stCondLst>
-                              <p:cond delay="0"/>
-                            </p:stCondLst>
-                            <p:childTnLst>
-                              <p:par>
-                                <p:cTn id="5" presetID="10" presetClass="entr" presetSubtype="0" fill="hold" nodeType="clickEffect">
-                                  <p:stCondLst>
-                                    <p:cond delay="0"/>
-                                  </p:stCondLst>
-                                  <p:childTnLst>
-                                    <p:set>
-                                      <p:cBhvr>
-                                        <p:cTn id="6" dur="1" fill="hold">
-                                          <p:stCondLst>
-                                            <p:cond delay="0"/>
-                                          </p:stCondLst>
-                                        </p:cTn>
-                                        <p:tgtEl>
-                                          <p:spTgt spid="96">
-                                            <p:txEl>
-                                              <p:pRg st="1" end="1"/>
-                                            </p:txEl>
-                                          </p:spTgt>
-                                        </p:tgtEl>
-                                        <p:attrNameLst>
-                                          <p:attrName>style.visibility</p:attrName>
-                                        </p:attrNameLst>
-                                      </p:cBhvr>
-                                      <p:to>
-                                        <p:strVal val="visible"/>
-                                      </p:to>
-                                    </p:set>
-                                    <p:animEffect transition="in" filter="fade">
-                                      <p:cBhvr>
-                                        <p:cTn id="7" dur="1000"/>
-                                        <p:tgtEl>
-                                          <p:spTgt spid="96">
-                                            <p:txEl>
-                                              <p:pRg st="1" end="1"/>
-                                            </p:txEl>
-                                          </p:spTgt>
-                                        </p:tgtEl>
-                                      </p:cBhvr>
-                                    </p:animEffect>
-                                  </p:childTnLst>
-                                </p:cTn>
-                              </p:par>
-                            </p:childTnLst>
-                          </p:cTn>
-                        </p:par>
-                      </p:childTnLst>
-                    </p:cTn>
-                  </p:par>
-                  <p:par>
-                    <p:cTn id="8" fill="hold">
-                      <p:stCondLst>
-                        <p:cond delay="indefinite"/>
-                      </p:stCondLst>
-                      <p:childTnLst>
-                        <p:par>
-                          <p:cTn id="9" fill="hold">
-                            <p:stCondLst>
-                              <p:cond delay="0"/>
-                            </p:stCondLst>
-                            <p:childTnLst>
-                              <p:par>
-                                <p:cTn id="10" presetID="10" presetClass="entr" presetSubtype="0" fill="hold" nodeType="clickEffect">
-                                  <p:stCondLst>
-                                    <p:cond delay="0"/>
-                                  </p:stCondLst>
-                                  <p:childTnLst>
-                                    <p:set>
-                                      <p:cBhvr>
-                                        <p:cTn id="11" dur="1" fill="hold">
-                                          <p:stCondLst>
-                                            <p:cond delay="0"/>
-                                          </p:stCondLst>
-                                        </p:cTn>
-                                        <p:tgtEl>
-                                          <p:spTgt spid="96">
-                                            <p:txEl>
-                                              <p:pRg st="3" end="3"/>
-                                            </p:txEl>
-                                          </p:spTgt>
-                                        </p:tgtEl>
-                                        <p:attrNameLst>
-                                          <p:attrName>style.visibility</p:attrName>
-                                        </p:attrNameLst>
-                                      </p:cBhvr>
-                                      <p:to>
-                                        <p:strVal val="visible"/>
-                                      </p:to>
-                                    </p:set>
-                                    <p:animEffect transition="in" filter="fade">
-                                      <p:cBhvr>
-                                        <p:cTn id="12" dur="1000"/>
-                                        <p:tgtEl>
-                                          <p:spTgt spid="96">
-                                            <p:txEl>
-                                              <p:pRg st="3" end="3"/>
-                                            </p:txEl>
-                                          </p:spTgt>
-                                        </p:tgtEl>
-                                      </p:cBhvr>
-                                    </p:animEffect>
-                                  </p:childTnLst>
-                                </p:cTn>
-                              </p:par>
-                            </p:childTnLst>
-                          </p:cTn>
-                        </p:par>
-                      </p:childTnLst>
-                    </p:cTn>
-                  </p:par>
-                  <p:par>
-                    <p:cTn id="13" fill="hold">
-                      <p:stCondLst>
-                        <p:cond delay="indefinite"/>
-                      </p:stCondLst>
-                      <p:childTnLst>
-                        <p:par>
-                          <p:cTn id="14" fill="hold">
-                            <p:stCondLst>
-                              <p:cond delay="0"/>
-                            </p:stCondLst>
-                            <p:childTnLst>
-                              <p:par>
-                                <p:cTn id="15" presetID="10" presetClass="entr" presetSubtype="0" fill="hold" nodeType="clickEffect">
-                                  <p:stCondLst>
-                                    <p:cond delay="0"/>
-                                  </p:stCondLst>
-                                  <p:childTnLst>
-                                    <p:set>
-                                      <p:cBhvr>
-                                        <p:cTn id="16" dur="1" fill="hold">
-                                          <p:stCondLst>
-                                            <p:cond delay="0"/>
-                                          </p:stCondLst>
-                                        </p:cTn>
-                                        <p:tgtEl>
-                                          <p:spTgt spid="96">
-                                            <p:txEl>
-                                              <p:pRg st="5" end="5"/>
-                                            </p:txEl>
-                                          </p:spTgt>
-                                        </p:tgtEl>
-                                        <p:attrNameLst>
-                                          <p:attrName>style.visibility</p:attrName>
-                                        </p:attrNameLst>
-                                      </p:cBhvr>
-                                      <p:to>
-                                        <p:strVal val="visible"/>
-                                      </p:to>
-                                    </p:set>
-                                    <p:animEffect transition="in" filter="fade">
-                                      <p:cBhvr>
-                                        <p:cTn id="17" dur="1000"/>
-                                        <p:tgtEl>
-                                          <p:spTgt spid="96">
-                                            <p:txEl>
-                                              <p:pRg st="5" end="5"/>
-                                            </p:txEl>
-                                          </p:spTgt>
-                                        </p:tgtEl>
-                                      </p:cBhvr>
-                                    </p:animEffect>
-                                  </p:childTnLst>
-                                </p:cTn>
-                              </p:par>
-                            </p:childTnLst>
-                          </p:cTn>
-                        </p:par>
-                      </p:childTnLst>
-                    </p:cTn>
-                  </p:par>
-                </p:childTnLst>
-              </p:cTn>
-              <p:prevCondLst>
-                <p:cond evt="onPrev" delay="0">
-                  <p:tgtEl>
-                    <p:sldTgt/>
-                  </p:tgtEl>
-                </p:cond>
-              </p:prevCondLst>
-              <p:nextCondLst>
-                <p:cond evt="onNext" delay="0">
-                  <p:tgtEl>
-                    <p:sldTgt/>
-                  </p:tgtEl>
-                </p:cond>
-              </p:nextCondLst>
-            </p:seq>
-          </p:childTnLst>
-        </p:cTn>
-      </p:par>
-    </p:tnLst>
-  </p:timing>
 </p:sld>
 </file>
 
@@ -22411,6 +22272,449 @@
                   <a:srgbClr val="E46102"/>
                 </a:solidFill>
               </a:rPr>
+              <a:t>Linear Regression Model</a:t>
+            </a:r>
+            <a:endParaRPr sz="4000" b="1" dirty="0">
+              <a:solidFill>
+                <a:srgbClr val="E46102"/>
+              </a:solidFill>
+            </a:endParaRPr>
+          </a:p>
+        </p:txBody>
+      </p:sp>
+      <p:sp>
+        <p:nvSpPr>
+          <p:cNvPr id="96" name="Google Shape;96;p14"/>
+          <p:cNvSpPr txBox="1"/>
+          <p:nvPr/>
+        </p:nvSpPr>
+        <p:spPr>
+          <a:xfrm>
+            <a:off x="437321" y="1090106"/>
+            <a:ext cx="10778213" cy="5042664"/>
+          </a:xfrm>
+          <a:prstGeom prst="rect">
+            <a:avLst/>
+          </a:prstGeom>
+          <a:noFill/>
+          <a:ln>
+            <a:noFill/>
+          </a:ln>
+        </p:spPr>
+        <p:txBody>
+          <a:bodyPr spcFirstLastPara="1" wrap="square" lIns="121900" tIns="121900" rIns="121900" bIns="121900" anchor="t" anchorCtr="0">
+            <a:noAutofit/>
+          </a:bodyPr>
+          <a:lstStyle/>
+          <a:p>
+            <a:pPr marL="444498" indent="-342900">
+              <a:buSzPct val="100000"/>
+              <a:buFont typeface="Arial" panose="020B0604020202020204" pitchFamily="34" charset="0"/>
+              <a:buChar char="•"/>
+            </a:pPr>
+            <a:endParaRPr lang="en-US" sz="2000" dirty="0"/>
+          </a:p>
+          <a:p>
+            <a:pPr marL="444498" indent="-342900">
+              <a:buSzPct val="100000"/>
+              <a:buFont typeface="Arial" panose="020B0604020202020204" pitchFamily="34" charset="0"/>
+              <a:buChar char="•"/>
+            </a:pPr>
+            <a:r>
+              <a:rPr lang="en-US" sz="2000" dirty="0"/>
+              <a:t>Cost Function : measures the distance between the linear model’s predictions and the training examples; the objective is to minimize this distance.</a:t>
+            </a:r>
+          </a:p>
+          <a:p>
+            <a:pPr marL="444498" indent="-342900">
+              <a:buSzPct val="100000"/>
+              <a:buFont typeface="Arial" panose="020B0604020202020204" pitchFamily="34" charset="0"/>
+              <a:buChar char="•"/>
+            </a:pPr>
+            <a:endParaRPr lang="en-US" sz="2000" dirty="0"/>
+          </a:p>
+          <a:p>
+            <a:pPr marL="444498" indent="-342900">
+              <a:buSzPct val="100000"/>
+              <a:buFont typeface="Arial" panose="020B0604020202020204" pitchFamily="34" charset="0"/>
+              <a:buChar char="•"/>
+            </a:pPr>
+            <a:r>
+              <a:rPr lang="en-US" sz="2000" dirty="0"/>
+              <a:t>Model Training: Input your training data to a LR model, and it will find the parameters that make the model fit best to your data.</a:t>
+            </a:r>
+          </a:p>
+          <a:p>
+            <a:pPr marL="444498" indent="-342900">
+              <a:buSzPct val="100000"/>
+              <a:buFont typeface="Arial" panose="020B0604020202020204" pitchFamily="34" charset="0"/>
+              <a:buChar char="•"/>
+            </a:pPr>
+            <a:endParaRPr lang="en-US" sz="2000" dirty="0"/>
+          </a:p>
+          <a:p>
+            <a:pPr marL="444498" indent="-342900">
+              <a:buSzPct val="100000"/>
+              <a:buFont typeface="Arial" panose="020B0604020202020204" pitchFamily="34" charset="0"/>
+              <a:buChar char="•"/>
+            </a:pPr>
+            <a:r>
+              <a:rPr lang="en-US" sz="2000" dirty="0"/>
+              <a:t>In the figure, model fits the training data closely</a:t>
+            </a:r>
+          </a:p>
+          <a:p>
+            <a:pPr marL="101598">
+              <a:buSzPct val="100000"/>
+            </a:pPr>
+            <a:endParaRPr lang="en-US" sz="2000" dirty="0"/>
+          </a:p>
+        </p:txBody>
+      </p:sp>
+      <p:pic>
+        <p:nvPicPr>
+          <p:cNvPr id="2" name="Picture 1">
+            <a:extLst>
+              <a:ext uri="{FF2B5EF4-FFF2-40B4-BE49-F238E27FC236}">
+                <a16:creationId xmlns:a16="http://schemas.microsoft.com/office/drawing/2014/main" id="{BC2C8278-7422-4D2B-9F00-4537AB0686AE}"/>
+              </a:ext>
+            </a:extLst>
+          </p:cNvPr>
+          <p:cNvPicPr>
+            <a:picLocks noChangeAspect="1"/>
+          </p:cNvPicPr>
+          <p:nvPr/>
+        </p:nvPicPr>
+        <p:blipFill>
+          <a:blip r:embed="rId3"/>
+          <a:stretch>
+            <a:fillRect/>
+          </a:stretch>
+        </p:blipFill>
+        <p:spPr>
+          <a:xfrm>
+            <a:off x="7267799" y="3401700"/>
+            <a:ext cx="4195138" cy="2355343"/>
+          </a:xfrm>
+          <a:prstGeom prst="rect">
+            <a:avLst/>
+          </a:prstGeom>
+        </p:spPr>
+      </p:pic>
+      <p:sp>
+        <p:nvSpPr>
+          <p:cNvPr id="4" name="TextBox 3">
+            <a:extLst>
+              <a:ext uri="{FF2B5EF4-FFF2-40B4-BE49-F238E27FC236}">
+                <a16:creationId xmlns:a16="http://schemas.microsoft.com/office/drawing/2014/main" id="{9A8D91BB-55C7-4831-A05A-19338F66FB78}"/>
+              </a:ext>
+            </a:extLst>
+          </p:cNvPr>
+          <p:cNvSpPr txBox="1"/>
+          <p:nvPr/>
+        </p:nvSpPr>
+        <p:spPr>
+          <a:xfrm>
+            <a:off x="7426205" y="5757043"/>
+            <a:ext cx="4065431" cy="307777"/>
+          </a:xfrm>
+          <a:prstGeom prst="rect">
+            <a:avLst/>
+          </a:prstGeom>
+          <a:noFill/>
+        </p:spPr>
+        <p:txBody>
+          <a:bodyPr wrap="square" rtlCol="0">
+            <a:spAutoFit/>
+          </a:bodyPr>
+          <a:lstStyle/>
+          <a:p>
+            <a:pPr algn="ctr"/>
+            <a:r>
+              <a:rPr lang="en-US" sz="1400" i="1" dirty="0">
+                <a:solidFill>
+                  <a:srgbClr val="E46102"/>
+                </a:solidFill>
+              </a:rPr>
+              <a:t>Linear model that fits the training data best</a:t>
+            </a:r>
+          </a:p>
+        </p:txBody>
+      </p:sp>
+    </p:spTree>
+    <p:extLst>
+      <p:ext uri="{BB962C8B-B14F-4D97-AF65-F5344CB8AC3E}">
+        <p14:creationId xmlns:p14="http://schemas.microsoft.com/office/powerpoint/2010/main" val="436401338"/>
+      </p:ext>
+    </p:extLst>
+  </p:cSld>
+  <p:clrMapOvr>
+    <a:masterClrMapping/>
+  </p:clrMapOvr>
+  <p:timing>
+    <p:tnLst>
+      <p:par>
+        <p:cTn id="1" dur="indefinite" restart="never" nodeType="tmRoot">
+          <p:childTnLst>
+            <p:seq concurrent="1" nextAc="seek">
+              <p:cTn id="2" dur="indefinite" nodeType="mainSeq">
+                <p:childTnLst>
+                  <p:par>
+                    <p:cTn id="3" fill="hold">
+                      <p:stCondLst>
+                        <p:cond delay="indefinite"/>
+                      </p:stCondLst>
+                      <p:childTnLst>
+                        <p:par>
+                          <p:cTn id="4" fill="hold">
+                            <p:stCondLst>
+                              <p:cond delay="0"/>
+                            </p:stCondLst>
+                            <p:childTnLst>
+                              <p:par>
+                                <p:cTn id="5" presetID="10" presetClass="entr" presetSubtype="0" fill="hold" nodeType="clickEffect">
+                                  <p:stCondLst>
+                                    <p:cond delay="0"/>
+                                  </p:stCondLst>
+                                  <p:childTnLst>
+                                    <p:set>
+                                      <p:cBhvr>
+                                        <p:cTn id="6" dur="1" fill="hold">
+                                          <p:stCondLst>
+                                            <p:cond delay="0"/>
+                                          </p:stCondLst>
+                                        </p:cTn>
+                                        <p:tgtEl>
+                                          <p:spTgt spid="96">
+                                            <p:txEl>
+                                              <p:pRg st="1" end="1"/>
+                                            </p:txEl>
+                                          </p:spTgt>
+                                        </p:tgtEl>
+                                        <p:attrNameLst>
+                                          <p:attrName>style.visibility</p:attrName>
+                                        </p:attrNameLst>
+                                      </p:cBhvr>
+                                      <p:to>
+                                        <p:strVal val="visible"/>
+                                      </p:to>
+                                    </p:set>
+                                    <p:animEffect transition="in" filter="fade">
+                                      <p:cBhvr>
+                                        <p:cTn id="7" dur="1000"/>
+                                        <p:tgtEl>
+                                          <p:spTgt spid="96">
+                                            <p:txEl>
+                                              <p:pRg st="1" end="1"/>
+                                            </p:txEl>
+                                          </p:spTgt>
+                                        </p:tgtEl>
+                                      </p:cBhvr>
+                                    </p:animEffect>
+                                  </p:childTnLst>
+                                </p:cTn>
+                              </p:par>
+                            </p:childTnLst>
+                          </p:cTn>
+                        </p:par>
+                      </p:childTnLst>
+                    </p:cTn>
+                  </p:par>
+                  <p:par>
+                    <p:cTn id="8" fill="hold">
+                      <p:stCondLst>
+                        <p:cond delay="indefinite"/>
+                      </p:stCondLst>
+                      <p:childTnLst>
+                        <p:par>
+                          <p:cTn id="9" fill="hold">
+                            <p:stCondLst>
+                              <p:cond delay="0"/>
+                            </p:stCondLst>
+                            <p:childTnLst>
+                              <p:par>
+                                <p:cTn id="10" presetID="10" presetClass="entr" presetSubtype="0" fill="hold" nodeType="clickEffect">
+                                  <p:stCondLst>
+                                    <p:cond delay="0"/>
+                                  </p:stCondLst>
+                                  <p:childTnLst>
+                                    <p:set>
+                                      <p:cBhvr>
+                                        <p:cTn id="11" dur="1" fill="hold">
+                                          <p:stCondLst>
+                                            <p:cond delay="0"/>
+                                          </p:stCondLst>
+                                        </p:cTn>
+                                        <p:tgtEl>
+                                          <p:spTgt spid="96">
+                                            <p:txEl>
+                                              <p:pRg st="3" end="3"/>
+                                            </p:txEl>
+                                          </p:spTgt>
+                                        </p:tgtEl>
+                                        <p:attrNameLst>
+                                          <p:attrName>style.visibility</p:attrName>
+                                        </p:attrNameLst>
+                                      </p:cBhvr>
+                                      <p:to>
+                                        <p:strVal val="visible"/>
+                                      </p:to>
+                                    </p:set>
+                                    <p:animEffect transition="in" filter="fade">
+                                      <p:cBhvr>
+                                        <p:cTn id="12" dur="1000"/>
+                                        <p:tgtEl>
+                                          <p:spTgt spid="96">
+                                            <p:txEl>
+                                              <p:pRg st="3" end="3"/>
+                                            </p:txEl>
+                                          </p:spTgt>
+                                        </p:tgtEl>
+                                      </p:cBhvr>
+                                    </p:animEffect>
+                                  </p:childTnLst>
+                                </p:cTn>
+                              </p:par>
+                            </p:childTnLst>
+                          </p:cTn>
+                        </p:par>
+                      </p:childTnLst>
+                    </p:cTn>
+                  </p:par>
+                  <p:par>
+                    <p:cTn id="13" fill="hold">
+                      <p:stCondLst>
+                        <p:cond delay="indefinite"/>
+                      </p:stCondLst>
+                      <p:childTnLst>
+                        <p:par>
+                          <p:cTn id="14" fill="hold">
+                            <p:stCondLst>
+                              <p:cond delay="0"/>
+                            </p:stCondLst>
+                            <p:childTnLst>
+                              <p:par>
+                                <p:cTn id="15" presetID="10" presetClass="entr" presetSubtype="0" fill="hold" nodeType="clickEffect">
+                                  <p:stCondLst>
+                                    <p:cond delay="0"/>
+                                  </p:stCondLst>
+                                  <p:childTnLst>
+                                    <p:set>
+                                      <p:cBhvr>
+                                        <p:cTn id="16" dur="1" fill="hold">
+                                          <p:stCondLst>
+                                            <p:cond delay="0"/>
+                                          </p:stCondLst>
+                                        </p:cTn>
+                                        <p:tgtEl>
+                                          <p:spTgt spid="96">
+                                            <p:txEl>
+                                              <p:pRg st="5" end="5"/>
+                                            </p:txEl>
+                                          </p:spTgt>
+                                        </p:tgtEl>
+                                        <p:attrNameLst>
+                                          <p:attrName>style.visibility</p:attrName>
+                                        </p:attrNameLst>
+                                      </p:cBhvr>
+                                      <p:to>
+                                        <p:strVal val="visible"/>
+                                      </p:to>
+                                    </p:set>
+                                    <p:animEffect transition="in" filter="fade">
+                                      <p:cBhvr>
+                                        <p:cTn id="17" dur="1000"/>
+                                        <p:tgtEl>
+                                          <p:spTgt spid="96">
+                                            <p:txEl>
+                                              <p:pRg st="5" end="5"/>
+                                            </p:txEl>
+                                          </p:spTgt>
+                                        </p:tgtEl>
+                                      </p:cBhvr>
+                                    </p:animEffect>
+                                  </p:childTnLst>
+                                </p:cTn>
+                              </p:par>
+                            </p:childTnLst>
+                          </p:cTn>
+                        </p:par>
+                      </p:childTnLst>
+                    </p:cTn>
+                  </p:par>
+                </p:childTnLst>
+              </p:cTn>
+              <p:prevCondLst>
+                <p:cond evt="onPrev" delay="0">
+                  <p:tgtEl>
+                    <p:sldTgt/>
+                  </p:tgtEl>
+                </p:cond>
+              </p:prevCondLst>
+              <p:nextCondLst>
+                <p:cond evt="onNext" delay="0">
+                  <p:tgtEl>
+                    <p:sldTgt/>
+                  </p:tgtEl>
+                </p:cond>
+              </p:nextCondLst>
+            </p:seq>
+          </p:childTnLst>
+        </p:cTn>
+      </p:par>
+    </p:tnLst>
+  </p:timing>
+</p:sld>
+</file>
+
+<file path=ppt/slides/slide31.xml><?xml version="1.0" encoding="utf-8"?>
+<p:sld xmlns:a="http://schemas.openxmlformats.org/drawingml/2006/main" xmlns:r="http://schemas.openxmlformats.org/officeDocument/2006/relationships" xmlns:p="http://schemas.openxmlformats.org/presentationml/2006/main">
+  <p:cSld>
+    <p:spTree>
+      <p:nvGrpSpPr>
+        <p:cNvPr id="1" name="Shape 94"/>
+        <p:cNvGrpSpPr/>
+        <p:nvPr/>
+      </p:nvGrpSpPr>
+      <p:grpSpPr>
+        <a:xfrm>
+          <a:off x="0" y="0"/>
+          <a:ext cx="0" cy="0"/>
+          <a:chOff x="0" y="0"/>
+          <a:chExt cx="0" cy="0"/>
+        </a:xfrm>
+      </p:grpSpPr>
+      <p:sp>
+        <p:nvSpPr>
+          <p:cNvPr id="95" name="Google Shape;95;p14"/>
+          <p:cNvSpPr txBox="1">
+            <a:spLocks noGrp="1"/>
+          </p:cNvSpPr>
+          <p:nvPr>
+            <p:ph type="title" idx="4294967295"/>
+          </p:nvPr>
+        </p:nvSpPr>
+        <p:spPr>
+          <a:xfrm>
+            <a:off x="717173" y="559537"/>
+            <a:ext cx="10972800" cy="506789"/>
+          </a:xfrm>
+          <a:prstGeom prst="rect">
+            <a:avLst/>
+          </a:prstGeom>
+        </p:spPr>
+        <p:txBody>
+          <a:bodyPr spcFirstLastPara="1" wrap="square" lIns="121900" tIns="121900" rIns="121900" bIns="121900" anchor="ctr" anchorCtr="0">
+            <a:noAutofit/>
+          </a:bodyPr>
+          <a:lstStyle/>
+          <a:p>
+            <a:r>
+              <a:rPr lang="en-US" sz="4000" b="1" dirty="0">
+                <a:solidFill>
+                  <a:srgbClr val="E46102"/>
+                </a:solidFill>
+              </a:rPr>
               <a:t>Challenges in ML</a:t>
             </a:r>
             <a:endParaRPr sz="4000" b="1" dirty="0">
@@ -22824,7 +23128,7 @@
 </p:sld>
 </file>
 
-<file path=ppt/slides/slide31.xml><?xml version="1.0" encoding="utf-8"?>
+<file path=ppt/slides/slide32.xml><?xml version="1.0" encoding="utf-8"?>
 <p:sld xmlns:a="http://schemas.openxmlformats.org/drawingml/2006/main" xmlns:r="http://schemas.openxmlformats.org/officeDocument/2006/relationships" xmlns:p="http://schemas.openxmlformats.org/presentationml/2006/main">
   <p:cSld>
     <p:spTree>
@@ -23347,7 +23651,7 @@
 </p:sld>
 </file>
 
-<file path=ppt/slides/slide32.xml><?xml version="1.0" encoding="utf-8"?>
+<file path=ppt/slides/slide33.xml><?xml version="1.0" encoding="utf-8"?>
 <p:sld xmlns:a="http://schemas.openxmlformats.org/drawingml/2006/main" xmlns:r="http://schemas.openxmlformats.org/officeDocument/2006/relationships" xmlns:p="http://schemas.openxmlformats.org/presentationml/2006/main">
   <p:cSld>
     <p:spTree>
@@ -24012,412 +24316,6 @@
 </p:sld>
 </file>
 
-<file path=ppt/slides/slide33.xml><?xml version="1.0" encoding="utf-8"?>
-<p:sld xmlns:a="http://schemas.openxmlformats.org/drawingml/2006/main" xmlns:r="http://schemas.openxmlformats.org/officeDocument/2006/relationships" xmlns:p="http://schemas.openxmlformats.org/presentationml/2006/main">
-  <p:cSld>
-    <p:spTree>
-      <p:nvGrpSpPr>
-        <p:cNvPr id="1" name="Shape 94"/>
-        <p:cNvGrpSpPr/>
-        <p:nvPr/>
-      </p:nvGrpSpPr>
-      <p:grpSpPr>
-        <a:xfrm>
-          <a:off x="0" y="0"/>
-          <a:ext cx="0" cy="0"/>
-          <a:chOff x="0" y="0"/>
-          <a:chExt cx="0" cy="0"/>
-        </a:xfrm>
-      </p:grpSpPr>
-      <p:sp>
-        <p:nvSpPr>
-          <p:cNvPr id="95" name="Google Shape;95;p14"/>
-          <p:cNvSpPr txBox="1">
-            <a:spLocks noGrp="1"/>
-          </p:cNvSpPr>
-          <p:nvPr>
-            <p:ph type="title" idx="4294967295"/>
-          </p:nvPr>
-        </p:nvSpPr>
-        <p:spPr>
-          <a:xfrm>
-            <a:off x="717173" y="559537"/>
-            <a:ext cx="10972800" cy="506789"/>
-          </a:xfrm>
-          <a:prstGeom prst="rect">
-            <a:avLst/>
-          </a:prstGeom>
-        </p:spPr>
-        <p:txBody>
-          <a:bodyPr spcFirstLastPara="1" wrap="square" lIns="121900" tIns="121900" rIns="121900" bIns="121900" anchor="ctr" anchorCtr="0">
-            <a:noAutofit/>
-          </a:bodyPr>
-          <a:lstStyle/>
-          <a:p>
-            <a:r>
-              <a:rPr lang="en-US" sz="4000" b="1" dirty="0">
-                <a:solidFill>
-                  <a:srgbClr val="E46102"/>
-                </a:solidFill>
-              </a:rPr>
-              <a:t>Build a model - 1</a:t>
-            </a:r>
-            <a:endParaRPr sz="4000" b="1" dirty="0">
-              <a:solidFill>
-                <a:srgbClr val="E46102"/>
-              </a:solidFill>
-            </a:endParaRPr>
-          </a:p>
-        </p:txBody>
-      </p:sp>
-      <p:sp>
-        <p:nvSpPr>
-          <p:cNvPr id="96" name="Google Shape;96;p14"/>
-          <p:cNvSpPr txBox="1"/>
-          <p:nvPr/>
-        </p:nvSpPr>
-        <p:spPr>
-          <a:xfrm>
-            <a:off x="521776" y="1137532"/>
-            <a:ext cx="11277600" cy="5198874"/>
-          </a:xfrm>
-          <a:prstGeom prst="rect">
-            <a:avLst/>
-          </a:prstGeom>
-          <a:noFill/>
-          <a:ln>
-            <a:noFill/>
-          </a:ln>
-        </p:spPr>
-        <p:txBody>
-          <a:bodyPr spcFirstLastPara="1" wrap="square" lIns="121900" tIns="121900" rIns="121900" bIns="121900" anchor="t" anchorCtr="0">
-            <a:noAutofit/>
-          </a:bodyPr>
-          <a:lstStyle/>
-          <a:p>
-            <a:pPr marL="609585" indent="-507987">
-              <a:buSzPct val="100000"/>
-              <a:buChar char="●"/>
-            </a:pPr>
-            <a:r>
-              <a:rPr lang="en-US" sz="2000" dirty="0"/>
-              <a:t>Housing prices in CA</a:t>
-            </a:r>
-          </a:p>
-          <a:p>
-            <a:pPr marL="609585" indent="-507987">
-              <a:buSzPct val="100000"/>
-              <a:buChar char="●"/>
-            </a:pPr>
-            <a:endParaRPr lang="en-US" sz="2000" dirty="0"/>
-          </a:p>
-          <a:p>
-            <a:pPr marL="609585" indent="-507987">
-              <a:buSzPct val="100000"/>
-              <a:buChar char="●"/>
-            </a:pPr>
-            <a:r>
-              <a:rPr lang="en-US" sz="2000" dirty="0"/>
-              <a:t>Data : CA census data, it has metrics such as population, median income, median housing price, and so on for each block group in California</a:t>
-            </a:r>
-          </a:p>
-          <a:p>
-            <a:pPr marL="609585" indent="-507987">
-              <a:buSzPct val="100000"/>
-              <a:buChar char="●"/>
-            </a:pPr>
-            <a:endParaRPr lang="en-US" sz="2000" dirty="0"/>
-          </a:p>
-          <a:p>
-            <a:pPr marL="609585" indent="-507987">
-              <a:buSzPct val="100000"/>
-              <a:buChar char="●"/>
-            </a:pPr>
-            <a:r>
-              <a:rPr lang="en-US" sz="2000" dirty="0"/>
-              <a:t>Goal: Predict median housing price in any district, given all the other metrics.</a:t>
-            </a:r>
-          </a:p>
-          <a:p>
-            <a:pPr marL="101598">
-              <a:buSzPct val="100000"/>
-            </a:pPr>
-            <a:endParaRPr lang="en-US" sz="2000" dirty="0"/>
-          </a:p>
-        </p:txBody>
-      </p:sp>
-      <p:sp>
-        <p:nvSpPr>
-          <p:cNvPr id="2" name="TextBox 1">
-            <a:extLst>
-              <a:ext uri="{FF2B5EF4-FFF2-40B4-BE49-F238E27FC236}">
-                <a16:creationId xmlns:a16="http://schemas.microsoft.com/office/drawing/2014/main" id="{3873BCF4-993D-4D20-B935-D19D85DD376F}"/>
-              </a:ext>
-            </a:extLst>
-          </p:cNvPr>
-          <p:cNvSpPr txBox="1"/>
-          <p:nvPr/>
-        </p:nvSpPr>
-        <p:spPr>
-          <a:xfrm flipH="1">
-            <a:off x="3579575" y="4474249"/>
-            <a:ext cx="5032850" cy="461665"/>
-          </a:xfrm>
-          <a:prstGeom prst="rect">
-            <a:avLst/>
-          </a:prstGeom>
-          <a:solidFill>
-            <a:schemeClr val="accent1">
-              <a:lumMod val="40000"/>
-              <a:lumOff val="60000"/>
-            </a:schemeClr>
-          </a:solidFill>
-          <a:ln w="28575">
-            <a:solidFill>
-              <a:srgbClr val="E46102"/>
-            </a:solidFill>
-          </a:ln>
-        </p:spPr>
-        <p:txBody>
-          <a:bodyPr wrap="square" rtlCol="0">
-            <a:spAutoFit/>
-          </a:bodyPr>
-          <a:lstStyle/>
-          <a:p>
-            <a:pPr algn="ctr"/>
-            <a:r>
-              <a:rPr lang="en-US" dirty="0"/>
-              <a:t>What should you do next?</a:t>
-            </a:r>
-          </a:p>
-        </p:txBody>
-      </p:sp>
-    </p:spTree>
-    <p:extLst>
-      <p:ext uri="{BB962C8B-B14F-4D97-AF65-F5344CB8AC3E}">
-        <p14:creationId xmlns:p14="http://schemas.microsoft.com/office/powerpoint/2010/main" val="2937816385"/>
-      </p:ext>
-    </p:extLst>
-  </p:cSld>
-  <p:clrMapOvr>
-    <a:masterClrMapping/>
-  </p:clrMapOvr>
-  <p:timing>
-    <p:tnLst>
-      <p:par>
-        <p:cTn id="1" dur="indefinite" restart="never" nodeType="tmRoot">
-          <p:childTnLst>
-            <p:seq concurrent="1" nextAc="seek">
-              <p:cTn id="2" dur="indefinite" nodeType="mainSeq">
-                <p:childTnLst>
-                  <p:par>
-                    <p:cTn id="3" fill="hold">
-                      <p:stCondLst>
-                        <p:cond delay="indefinite"/>
-                      </p:stCondLst>
-                      <p:childTnLst>
-                        <p:par>
-                          <p:cTn id="4" fill="hold">
-                            <p:stCondLst>
-                              <p:cond delay="0"/>
-                            </p:stCondLst>
-                            <p:childTnLst>
-                              <p:par>
-                                <p:cTn id="5" presetID="10" presetClass="entr" presetSubtype="0" fill="hold" nodeType="clickEffect">
-                                  <p:stCondLst>
-                                    <p:cond delay="0"/>
-                                  </p:stCondLst>
-                                  <p:childTnLst>
-                                    <p:set>
-                                      <p:cBhvr>
-                                        <p:cTn id="6" dur="1" fill="hold">
-                                          <p:stCondLst>
-                                            <p:cond delay="0"/>
-                                          </p:stCondLst>
-                                        </p:cTn>
-                                        <p:tgtEl>
-                                          <p:spTgt spid="96">
-                                            <p:txEl>
-                                              <p:pRg st="0" end="0"/>
-                                            </p:txEl>
-                                          </p:spTgt>
-                                        </p:tgtEl>
-                                        <p:attrNameLst>
-                                          <p:attrName>style.visibility</p:attrName>
-                                        </p:attrNameLst>
-                                      </p:cBhvr>
-                                      <p:to>
-                                        <p:strVal val="visible"/>
-                                      </p:to>
-                                    </p:set>
-                                    <p:animEffect transition="in" filter="fade">
-                                      <p:cBhvr>
-                                        <p:cTn id="7" dur="1000"/>
-                                        <p:tgtEl>
-                                          <p:spTgt spid="96">
-                                            <p:txEl>
-                                              <p:pRg st="0" end="0"/>
-                                            </p:txEl>
-                                          </p:spTgt>
-                                        </p:tgtEl>
-                                      </p:cBhvr>
-                                    </p:animEffect>
-                                  </p:childTnLst>
-                                </p:cTn>
-                              </p:par>
-                            </p:childTnLst>
-                          </p:cTn>
-                        </p:par>
-                      </p:childTnLst>
-                    </p:cTn>
-                  </p:par>
-                  <p:par>
-                    <p:cTn id="8" fill="hold">
-                      <p:stCondLst>
-                        <p:cond delay="indefinite"/>
-                      </p:stCondLst>
-                      <p:childTnLst>
-                        <p:par>
-                          <p:cTn id="9" fill="hold">
-                            <p:stCondLst>
-                              <p:cond delay="0"/>
-                            </p:stCondLst>
-                            <p:childTnLst>
-                              <p:par>
-                                <p:cTn id="10" presetID="10" presetClass="entr" presetSubtype="0" fill="hold" nodeType="clickEffect">
-                                  <p:stCondLst>
-                                    <p:cond delay="0"/>
-                                  </p:stCondLst>
-                                  <p:childTnLst>
-                                    <p:set>
-                                      <p:cBhvr>
-                                        <p:cTn id="11" dur="1" fill="hold">
-                                          <p:stCondLst>
-                                            <p:cond delay="0"/>
-                                          </p:stCondLst>
-                                        </p:cTn>
-                                        <p:tgtEl>
-                                          <p:spTgt spid="96">
-                                            <p:txEl>
-                                              <p:pRg st="2" end="2"/>
-                                            </p:txEl>
-                                          </p:spTgt>
-                                        </p:tgtEl>
-                                        <p:attrNameLst>
-                                          <p:attrName>style.visibility</p:attrName>
-                                        </p:attrNameLst>
-                                      </p:cBhvr>
-                                      <p:to>
-                                        <p:strVal val="visible"/>
-                                      </p:to>
-                                    </p:set>
-                                    <p:animEffect transition="in" filter="fade">
-                                      <p:cBhvr>
-                                        <p:cTn id="12" dur="1000"/>
-                                        <p:tgtEl>
-                                          <p:spTgt spid="96">
-                                            <p:txEl>
-                                              <p:pRg st="2" end="2"/>
-                                            </p:txEl>
-                                          </p:spTgt>
-                                        </p:tgtEl>
-                                      </p:cBhvr>
-                                    </p:animEffect>
-                                  </p:childTnLst>
-                                </p:cTn>
-                              </p:par>
-                            </p:childTnLst>
-                          </p:cTn>
-                        </p:par>
-                      </p:childTnLst>
-                    </p:cTn>
-                  </p:par>
-                  <p:par>
-                    <p:cTn id="13" fill="hold">
-                      <p:stCondLst>
-                        <p:cond delay="indefinite"/>
-                      </p:stCondLst>
-                      <p:childTnLst>
-                        <p:par>
-                          <p:cTn id="14" fill="hold">
-                            <p:stCondLst>
-                              <p:cond delay="0"/>
-                            </p:stCondLst>
-                            <p:childTnLst>
-                              <p:par>
-                                <p:cTn id="15" presetID="10" presetClass="entr" presetSubtype="0" fill="hold" nodeType="clickEffect">
-                                  <p:stCondLst>
-                                    <p:cond delay="0"/>
-                                  </p:stCondLst>
-                                  <p:childTnLst>
-                                    <p:set>
-                                      <p:cBhvr>
-                                        <p:cTn id="16" dur="1" fill="hold">
-                                          <p:stCondLst>
-                                            <p:cond delay="0"/>
-                                          </p:stCondLst>
-                                        </p:cTn>
-                                        <p:tgtEl>
-                                          <p:spTgt spid="96">
-                                            <p:txEl>
-                                              <p:pRg st="4" end="4"/>
-                                            </p:txEl>
-                                          </p:spTgt>
-                                        </p:tgtEl>
-                                        <p:attrNameLst>
-                                          <p:attrName>style.visibility</p:attrName>
-                                        </p:attrNameLst>
-                                      </p:cBhvr>
-                                      <p:to>
-                                        <p:strVal val="visible"/>
-                                      </p:to>
-                                    </p:set>
-                                    <p:animEffect transition="in" filter="fade">
-                                      <p:cBhvr>
-                                        <p:cTn id="17" dur="1000"/>
-                                        <p:tgtEl>
-                                          <p:spTgt spid="96">
-                                            <p:txEl>
-                                              <p:pRg st="4" end="4"/>
-                                            </p:txEl>
-                                          </p:spTgt>
-                                        </p:tgtEl>
-                                      </p:cBhvr>
-                                    </p:animEffect>
-                                  </p:childTnLst>
-                                </p:cTn>
-                              </p:par>
-                            </p:childTnLst>
-                          </p:cTn>
-                        </p:par>
-                      </p:childTnLst>
-                    </p:cTn>
-                  </p:par>
-                </p:childTnLst>
-              </p:cTn>
-              <p:prevCondLst>
-                <p:cond evt="onPrev" delay="0">
-                  <p:tgtEl>
-                    <p:sldTgt/>
-                  </p:tgtEl>
-                </p:cond>
-              </p:prevCondLst>
-              <p:nextCondLst>
-                <p:cond evt="onNext" delay="0">
-                  <p:tgtEl>
-                    <p:sldTgt/>
-                  </p:tgtEl>
-                </p:cond>
-              </p:nextCondLst>
-            </p:seq>
-          </p:childTnLst>
-        </p:cTn>
-      </p:par>
-    </p:tnLst>
-  </p:timing>
-</p:sld>
-</file>
-
 <file path=ppt/slides/slide34.xml><?xml version="1.0" encoding="utf-8"?>
 <p:sld xmlns:a="http://schemas.openxmlformats.org/drawingml/2006/main" xmlns:r="http://schemas.openxmlformats.org/officeDocument/2006/relationships" xmlns:p="http://schemas.openxmlformats.org/presentationml/2006/main">
   <p:cSld>
@@ -24447,7 +24345,7 @@
         </p:nvSpPr>
         <p:spPr>
           <a:xfrm>
-            <a:off x="717173" y="559537"/>
+            <a:off x="609600" y="2922211"/>
             <a:ext cx="10972800" cy="506789"/>
           </a:xfrm>
           <a:prstGeom prst="rect">
@@ -24466,7 +24364,29 @@
                   <a:srgbClr val="E46102"/>
                 </a:solidFill>
               </a:rPr>
-              <a:t>Build a model - 2</a:t>
+              <a:t>Put it all together</a:t>
+            </a:r>
+            <a:br>
+              <a:rPr lang="en-US" sz="4000" b="1" dirty="0">
+                <a:solidFill>
+                  <a:srgbClr val="E46102"/>
+                </a:solidFill>
+              </a:rPr>
+            </a:br>
+            <a:br>
+              <a:rPr lang="en-US" sz="4000" b="1" dirty="0">
+                <a:solidFill>
+                  <a:srgbClr val="E46102"/>
+                </a:solidFill>
+              </a:rPr>
+            </a:br>
+            <a:r>
+              <a:rPr lang="en-US" sz="4000" b="1" dirty="0">
+                <a:solidFill>
+                  <a:srgbClr val="E46102"/>
+                </a:solidFill>
+              </a:rPr>
+              <a:t>Let’s build a model</a:t>
             </a:r>
             <a:endParaRPr sz="4000" b="1" dirty="0">
               <a:solidFill>
@@ -24476,62 +24396,10 @@
           </a:p>
         </p:txBody>
       </p:sp>
-      <p:sp>
-        <p:nvSpPr>
-          <p:cNvPr id="96" name="Google Shape;96;p14"/>
-          <p:cNvSpPr txBox="1"/>
-          <p:nvPr/>
-        </p:nvSpPr>
-        <p:spPr>
-          <a:xfrm>
-            <a:off x="521776" y="1137532"/>
-            <a:ext cx="11277600" cy="5198874"/>
-          </a:xfrm>
-          <a:prstGeom prst="rect">
-            <a:avLst/>
-          </a:prstGeom>
-          <a:noFill/>
-          <a:ln>
-            <a:noFill/>
-          </a:ln>
-        </p:spPr>
-        <p:txBody>
-          <a:bodyPr spcFirstLastPara="1" wrap="square" lIns="121900" tIns="121900" rIns="121900" bIns="121900" anchor="t" anchorCtr="0">
-            <a:noAutofit/>
-          </a:bodyPr>
-          <a:lstStyle/>
-          <a:p>
-            <a:pPr marL="609585" indent="-507987">
-              <a:buSzPct val="100000"/>
-              <a:buChar char="●"/>
-            </a:pPr>
-            <a:endParaRPr lang="en-US" sz="2000" dirty="0"/>
-          </a:p>
-          <a:p>
-            <a:pPr marL="558798" indent="-457200">
-              <a:buSzPct val="100000"/>
-              <a:buFont typeface="+mj-lt"/>
-              <a:buAutoNum type="arabicPeriod"/>
-            </a:pPr>
-            <a:r>
-              <a:rPr lang="en-US" sz="2000" dirty="0"/>
-              <a:t>Frame the Problem</a:t>
-            </a:r>
-          </a:p>
-          <a:p>
-            <a:pPr marL="558798" indent="-457200">
-              <a:buSzPct val="100000"/>
-              <a:buFont typeface="+mj-lt"/>
-              <a:buAutoNum type="arabicPeriod"/>
-            </a:pPr>
-            <a:endParaRPr lang="en-US" sz="2000" dirty="0"/>
-          </a:p>
-        </p:txBody>
-      </p:sp>
     </p:spTree>
     <p:extLst>
       <p:ext uri="{BB962C8B-B14F-4D97-AF65-F5344CB8AC3E}">
-        <p14:creationId xmlns:p14="http://schemas.microsoft.com/office/powerpoint/2010/main" val="2923327648"/>
+        <p14:creationId xmlns:p14="http://schemas.microsoft.com/office/powerpoint/2010/main" val="769438773"/>
       </p:ext>
     </p:extLst>
   </p:cSld>
@@ -24589,7 +24457,7 @@
                   <a:srgbClr val="E46102"/>
                 </a:solidFill>
               </a:rPr>
-              <a:t>Build a model - 2</a:t>
+              <a:t>Build a model</a:t>
             </a:r>
             <a:endParaRPr sz="4000" b="1" dirty="0">
               <a:solidFill>
@@ -24624,62 +24492,274 @@
           </a:bodyPr>
           <a:lstStyle/>
           <a:p>
-            <a:pPr marL="609585" indent="-507987">
+            <a:pPr marL="444498" indent="-342900">
               <a:buSzPct val="100000"/>
-              <a:buChar char="●"/>
+              <a:buFont typeface="Arial" panose="020B0604020202020204" pitchFamily="34" charset="0"/>
+              <a:buChar char="•"/>
+            </a:pPr>
+            <a:r>
+              <a:rPr lang="en-US" sz="2000" dirty="0"/>
+              <a:t>Housing prices in California (CA)</a:t>
+            </a:r>
+          </a:p>
+          <a:p>
+            <a:pPr marL="101598">
+              <a:buSzPct val="100000"/>
             </a:pPr>
             <a:endParaRPr lang="en-US" sz="2000" dirty="0"/>
           </a:p>
           <a:p>
-            <a:pPr marL="558798" indent="-457200">
+            <a:pPr marL="444498" indent="-342900">
               <a:buSzPct val="100000"/>
-              <a:buFont typeface="+mj-lt"/>
-              <a:buAutoNum type="arabicPeriod"/>
+              <a:buFont typeface="Arial" panose="020B0604020202020204" pitchFamily="34" charset="0"/>
+              <a:buChar char="•"/>
             </a:pPr>
             <a:r>
               <a:rPr lang="en-US" sz="2000" dirty="0"/>
-              <a:t>Frame the Problem.</a:t>
-            </a:r>
-          </a:p>
-          <a:p>
-            <a:pPr marL="558798" indent="-457200">
+              <a:t>Data : CA census data, it has metrics such as population, median income, median housing price, and so on for each block group in California. Snapshot below:</a:t>
+            </a:r>
+          </a:p>
+          <a:p>
+            <a:pPr marL="444498" indent="-342900">
               <a:buSzPct val="100000"/>
-              <a:buFont typeface="+mj-lt"/>
-              <a:buAutoNum type="arabicPeriod"/>
+              <a:buFont typeface="Arial" panose="020B0604020202020204" pitchFamily="34" charset="0"/>
+              <a:buChar char="•"/>
             </a:pPr>
             <a:endParaRPr lang="en-US" sz="2000" dirty="0"/>
           </a:p>
           <a:p>
-            <a:pPr marL="558798" indent="-457200">
+            <a:pPr marL="444498" indent="-342900">
               <a:buSzPct val="100000"/>
-              <a:buFont typeface="+mj-lt"/>
-              <a:buAutoNum type="arabicPeriod"/>
+              <a:buFont typeface="Arial" panose="020B0604020202020204" pitchFamily="34" charset="0"/>
+              <a:buChar char="•"/>
+            </a:pPr>
+            <a:endParaRPr lang="en-US" sz="2000" dirty="0"/>
+          </a:p>
+          <a:p>
+            <a:pPr marL="444498" indent="-342900">
+              <a:buSzPct val="100000"/>
+              <a:buFont typeface="Arial" panose="020B0604020202020204" pitchFamily="34" charset="0"/>
+              <a:buChar char="•"/>
+            </a:pPr>
+            <a:endParaRPr lang="en-US" sz="2000" dirty="0"/>
+          </a:p>
+          <a:p>
+            <a:pPr marL="444498" indent="-342900">
+              <a:buSzPct val="100000"/>
+              <a:buFont typeface="Arial" panose="020B0604020202020204" pitchFamily="34" charset="0"/>
+              <a:buChar char="•"/>
+            </a:pPr>
+            <a:endParaRPr lang="en-US" sz="2000" dirty="0"/>
+          </a:p>
+          <a:p>
+            <a:pPr marL="444498" indent="-342900">
+              <a:buSzPct val="100000"/>
+              <a:buFont typeface="Arial" panose="020B0604020202020204" pitchFamily="34" charset="0"/>
+              <a:buChar char="•"/>
+            </a:pPr>
+            <a:endParaRPr lang="en-US" sz="2000" dirty="0"/>
+          </a:p>
+          <a:p>
+            <a:pPr marL="444498" indent="-342900">
+              <a:buSzPct val="100000"/>
+              <a:buFont typeface="Arial" panose="020B0604020202020204" pitchFamily="34" charset="0"/>
+              <a:buChar char="•"/>
+            </a:pPr>
+            <a:endParaRPr lang="en-US" sz="2000" dirty="0"/>
+          </a:p>
+          <a:p>
+            <a:pPr marL="444498" indent="-342900">
+              <a:buSzPct val="100000"/>
+              <a:buFont typeface="Arial" panose="020B0604020202020204" pitchFamily="34" charset="0"/>
+              <a:buChar char="•"/>
+            </a:pPr>
+            <a:endParaRPr lang="en-US" sz="2000" dirty="0"/>
+          </a:p>
+          <a:p>
+            <a:pPr marL="444498" indent="-342900">
+              <a:buSzPct val="100000"/>
+              <a:buFont typeface="Arial" panose="020B0604020202020204" pitchFamily="34" charset="0"/>
+              <a:buChar char="•"/>
             </a:pPr>
             <a:r>
               <a:rPr lang="en-US" sz="2000" dirty="0"/>
-              <a:t>What is the current solution?</a:t>
-            </a:r>
-          </a:p>
-          <a:p>
-            <a:pPr marL="558798" indent="-457200">
+              <a:t>Goal: Predict median housing price in any district, given all the other metrics.</a:t>
+            </a:r>
+          </a:p>
+          <a:p>
+            <a:pPr marL="444498" indent="-342900">
               <a:buSzPct val="100000"/>
-              <a:buFont typeface="+mj-lt"/>
-              <a:buAutoNum type="arabicPeriod"/>
+              <a:buFont typeface="Arial" panose="020B0604020202020204" pitchFamily="34" charset="0"/>
+              <a:buChar char="•"/>
             </a:pPr>
             <a:endParaRPr lang="en-US" sz="2000" dirty="0"/>
           </a:p>
         </p:txBody>
       </p:sp>
+      <p:sp>
+        <p:nvSpPr>
+          <p:cNvPr id="2" name="TextBox 1">
+            <a:extLst>
+              <a:ext uri="{FF2B5EF4-FFF2-40B4-BE49-F238E27FC236}">
+                <a16:creationId xmlns:a16="http://schemas.microsoft.com/office/drawing/2014/main" id="{3873BCF4-993D-4D20-B935-D19D85DD376F}"/>
+              </a:ext>
+            </a:extLst>
+          </p:cNvPr>
+          <p:cNvSpPr txBox="1"/>
+          <p:nvPr/>
+        </p:nvSpPr>
+        <p:spPr>
+          <a:xfrm flipH="1">
+            <a:off x="3433801" y="5258803"/>
+            <a:ext cx="5032850" cy="461665"/>
+          </a:xfrm>
+          <a:prstGeom prst="rect">
+            <a:avLst/>
+          </a:prstGeom>
+          <a:solidFill>
+            <a:schemeClr val="accent1">
+              <a:lumMod val="40000"/>
+              <a:lumOff val="60000"/>
+            </a:schemeClr>
+          </a:solidFill>
+          <a:ln w="28575">
+            <a:solidFill>
+              <a:srgbClr val="E46102"/>
+            </a:solidFill>
+          </a:ln>
+        </p:spPr>
+        <p:txBody>
+          <a:bodyPr wrap="square" rtlCol="0">
+            <a:spAutoFit/>
+          </a:bodyPr>
+          <a:lstStyle/>
+          <a:p>
+            <a:pPr algn="ctr"/>
+            <a:r>
+              <a:rPr lang="en-US" dirty="0"/>
+              <a:t>What should you do next?</a:t>
+            </a:r>
+          </a:p>
+        </p:txBody>
+      </p:sp>
+      <p:pic>
+        <p:nvPicPr>
+          <p:cNvPr id="4" name="Picture 3">
+            <a:extLst>
+              <a:ext uri="{FF2B5EF4-FFF2-40B4-BE49-F238E27FC236}">
+                <a16:creationId xmlns:a16="http://schemas.microsoft.com/office/drawing/2014/main" id="{3D764D2E-5210-924C-5A99-9117EE7C85AC}"/>
+              </a:ext>
+            </a:extLst>
+          </p:cNvPr>
+          <p:cNvPicPr>
+            <a:picLocks noChangeAspect="1"/>
+          </p:cNvPicPr>
+          <p:nvPr/>
+        </p:nvPicPr>
+        <p:blipFill>
+          <a:blip r:embed="rId3"/>
+          <a:stretch>
+            <a:fillRect/>
+          </a:stretch>
+        </p:blipFill>
+        <p:spPr>
+          <a:xfrm>
+            <a:off x="1868557" y="2583822"/>
+            <a:ext cx="7772400" cy="1690355"/>
+          </a:xfrm>
+          <a:prstGeom prst="rect">
+            <a:avLst/>
+          </a:prstGeom>
+        </p:spPr>
+      </p:pic>
     </p:spTree>
     <p:extLst>
       <p:ext uri="{BB962C8B-B14F-4D97-AF65-F5344CB8AC3E}">
-        <p14:creationId xmlns:p14="http://schemas.microsoft.com/office/powerpoint/2010/main" val="1911188984"/>
+        <p14:creationId xmlns:p14="http://schemas.microsoft.com/office/powerpoint/2010/main" val="2937816385"/>
       </p:ext>
     </p:extLst>
   </p:cSld>
   <p:clrMapOvr>
     <a:masterClrMapping/>
   </p:clrMapOvr>
+  <p:timing>
+    <p:tnLst>
+      <p:par>
+        <p:cTn id="1" dur="indefinite" restart="never" nodeType="tmRoot">
+          <p:childTnLst>
+            <p:seq concurrent="1" nextAc="seek">
+              <p:cTn id="2" dur="indefinite" nodeType="mainSeq">
+                <p:childTnLst>
+                  <p:par>
+                    <p:cTn id="3" fill="hold">
+                      <p:stCondLst>
+                        <p:cond delay="indefinite"/>
+                      </p:stCondLst>
+                      <p:childTnLst>
+                        <p:par>
+                          <p:cTn id="4" fill="hold">
+                            <p:stCondLst>
+                              <p:cond delay="0"/>
+                            </p:stCondLst>
+                            <p:childTnLst>
+                              <p:par>
+                                <p:cTn id="5" presetID="1" presetClass="entr" presetSubtype="0" fill="hold" grpId="0" nodeType="clickEffect">
+                                  <p:stCondLst>
+                                    <p:cond delay="0"/>
+                                  </p:stCondLst>
+                                  <p:childTnLst>
+                                    <p:set>
+                                      <p:cBhvr>
+                                        <p:cTn id="6" dur="1" fill="hold">
+                                          <p:stCondLst>
+                                            <p:cond delay="0"/>
+                                          </p:stCondLst>
+                                        </p:cTn>
+                                        <p:tgtEl>
+                                          <p:spTgt spid="2"/>
+                                        </p:tgtEl>
+                                        <p:attrNameLst>
+                                          <p:attrName>style.visibility</p:attrName>
+                                        </p:attrNameLst>
+                                      </p:cBhvr>
+                                      <p:to>
+                                        <p:strVal val="visible"/>
+                                      </p:to>
+                                    </p:set>
+                                  </p:childTnLst>
+                                </p:cTn>
+                              </p:par>
+                            </p:childTnLst>
+                          </p:cTn>
+                        </p:par>
+                      </p:childTnLst>
+                    </p:cTn>
+                  </p:par>
+                </p:childTnLst>
+              </p:cTn>
+              <p:prevCondLst>
+                <p:cond evt="onPrev" delay="0">
+                  <p:tgtEl>
+                    <p:sldTgt/>
+                  </p:tgtEl>
+                </p:cond>
+              </p:prevCondLst>
+              <p:nextCondLst>
+                <p:cond evt="onNext" delay="0">
+                  <p:tgtEl>
+                    <p:sldTgt/>
+                  </p:tgtEl>
+                </p:cond>
+              </p:nextCondLst>
+            </p:seq>
+          </p:childTnLst>
+        </p:cTn>
+      </p:par>
+    </p:tnLst>
+    <p:bldLst>
+      <p:bldP spid="2" grpId="0" animBg="1"/>
+    </p:bldLst>
+  </p:timing>
 </p:sld>
 </file>
 
@@ -24731,7 +24811,7 @@
                   <a:srgbClr val="E46102"/>
                 </a:solidFill>
               </a:rPr>
-              <a:t>Build a model - 2</a:t>
+              <a:t>Build a model</a:t>
             </a:r>
             <a:endParaRPr sz="4000" b="1" dirty="0">
               <a:solidFill>
@@ -24780,7 +24860,7 @@
             </a:pPr>
             <a:r>
               <a:rPr lang="en-US" sz="2000" dirty="0"/>
-              <a:t>Frame the Problem.</a:t>
+              <a:t>Understand the data</a:t>
             </a:r>
           </a:p>
           <a:p>
@@ -24789,7 +24869,10 @@
               <a:buFont typeface="+mj-lt"/>
               <a:buAutoNum type="arabicPeriod"/>
             </a:pPr>
-            <a:endParaRPr lang="en-US" sz="2000" dirty="0"/>
+            <a:r>
+              <a:rPr lang="en-US" sz="2000" dirty="0"/>
+              <a:t>What are the features and label?</a:t>
+            </a:r>
           </a:p>
           <a:p>
             <a:pPr marL="558798" indent="-457200">
@@ -24797,10 +24880,7 @@
               <a:buFont typeface="+mj-lt"/>
               <a:buAutoNum type="arabicPeriod"/>
             </a:pPr>
-            <a:r>
-              <a:rPr lang="en-US" sz="2000" dirty="0"/>
-              <a:t>What is the current solution?</a:t>
-            </a:r>
+            <a:endParaRPr lang="en-US" sz="2000" dirty="0"/>
           </a:p>
           <a:p>
             <a:pPr marL="558798" indent="-457200">
@@ -24816,58 +24896,201 @@
               <a:buFont typeface="+mj-lt"/>
               <a:buAutoNum type="arabicPeriod"/>
             </a:pPr>
-            <a:r>
-              <a:rPr lang="en-US" sz="2000" dirty="0"/>
-              <a:t>Start designing your system – </a:t>
-            </a:r>
-          </a:p>
-          <a:p>
-            <a:pPr marL="1168383" lvl="1" indent="-457200">
+            <a:endParaRPr lang="en-US" sz="2000" dirty="0"/>
+          </a:p>
+          <a:p>
+            <a:pPr marL="558798" indent="-457200">
               <a:buSzPct val="100000"/>
               <a:buFont typeface="+mj-lt"/>
               <a:buAutoNum type="arabicPeriod"/>
             </a:pPr>
-            <a:r>
-              <a:rPr lang="en-US" sz="2000" dirty="0"/>
-              <a:t>Is it supervised, unsupervised, or reinforcement learning?</a:t>
-            </a:r>
-          </a:p>
-          <a:p>
-            <a:pPr marL="1168383" lvl="1" indent="-457200">
+            <a:endParaRPr lang="en-US" sz="2000" dirty="0"/>
+          </a:p>
+          <a:p>
+            <a:pPr marL="558798" indent="-457200">
               <a:buSzPct val="100000"/>
               <a:buFont typeface="+mj-lt"/>
               <a:buAutoNum type="arabicPeriod"/>
             </a:pPr>
-            <a:r>
-              <a:rPr lang="en-US" sz="2000" dirty="0"/>
-              <a:t>Is it a classification, regression or some other task?</a:t>
-            </a:r>
-          </a:p>
-          <a:p>
-            <a:pPr marL="1168383" lvl="1" indent="-457200">
+            <a:endParaRPr lang="en-US" sz="2000" dirty="0"/>
+          </a:p>
+          <a:p>
+            <a:pPr marL="558798" indent="-457200">
               <a:buSzPct val="100000"/>
               <a:buFont typeface="+mj-lt"/>
               <a:buAutoNum type="arabicPeriod"/>
             </a:pPr>
+            <a:endParaRPr lang="en-US" sz="2000" dirty="0"/>
+          </a:p>
+          <a:p>
+            <a:pPr marL="558798" indent="-457200">
+              <a:buSzPct val="100000"/>
+              <a:buFont typeface="+mj-lt"/>
+              <a:buAutoNum type="arabicPeriod"/>
+            </a:pPr>
+            <a:endParaRPr lang="en-US" sz="2000" dirty="0"/>
+          </a:p>
+          <a:p>
+            <a:pPr marL="558798" indent="-457200">
+              <a:buSzPct val="100000"/>
+              <a:buFont typeface="+mj-lt"/>
+              <a:buAutoNum type="arabicPeriod"/>
+            </a:pPr>
+            <a:endParaRPr lang="en-US" sz="2000" dirty="0"/>
+          </a:p>
+          <a:p>
+            <a:pPr marL="558798" indent="-457200">
+              <a:buSzPct val="100000"/>
+              <a:buFont typeface="+mj-lt"/>
+              <a:buAutoNum type="arabicPeriod"/>
+            </a:pPr>
+            <a:endParaRPr lang="en-US" sz="2000" dirty="0"/>
+          </a:p>
+          <a:p>
+            <a:pPr marL="558798" indent="-457200">
+              <a:buSzPct val="100000"/>
+              <a:buFont typeface="+mj-lt"/>
+              <a:buAutoNum type="arabicPeriod"/>
+            </a:pPr>
             <a:r>
               <a:rPr lang="en-US" sz="2000" dirty="0"/>
-              <a:t>Should you use batch or online learning?</a:t>
-            </a:r>
-          </a:p>
-          <a:p>
-            <a:pPr marL="101598">
+              <a:t>Frame the Problem</a:t>
+            </a:r>
+          </a:p>
+          <a:p>
+            <a:pPr marL="558798" indent="-457200">
               <a:buSzPct val="100000"/>
+              <a:buFont typeface="+mj-lt"/>
+              <a:buAutoNum type="arabicPeriod"/>
             </a:pPr>
             <a:endParaRPr lang="en-US" sz="2000" dirty="0"/>
+          </a:p>
+        </p:txBody>
+      </p:sp>
+      <p:pic>
+        <p:nvPicPr>
+          <p:cNvPr id="2" name="Picture 1">
+            <a:extLst>
+              <a:ext uri="{FF2B5EF4-FFF2-40B4-BE49-F238E27FC236}">
+                <a16:creationId xmlns:a16="http://schemas.microsoft.com/office/drawing/2014/main" id="{7D2FB967-14F7-0058-DD4F-5822435B86A6}"/>
+              </a:ext>
+            </a:extLst>
+          </p:cNvPr>
+          <p:cNvPicPr>
+            <a:picLocks noChangeAspect="1"/>
+          </p:cNvPicPr>
+          <p:nvPr/>
+        </p:nvPicPr>
+        <p:blipFill>
+          <a:blip r:embed="rId3"/>
+          <a:stretch>
+            <a:fillRect/>
+          </a:stretch>
+        </p:blipFill>
+        <p:spPr>
+          <a:xfrm>
+            <a:off x="4026976" y="2318779"/>
+            <a:ext cx="7772400" cy="1690355"/>
+          </a:xfrm>
+          <a:prstGeom prst="rect">
+            <a:avLst/>
+          </a:prstGeom>
+        </p:spPr>
+      </p:pic>
+      <p:sp>
+        <p:nvSpPr>
+          <p:cNvPr id="9" name="Right Brace 8">
+            <a:extLst>
+              <a:ext uri="{FF2B5EF4-FFF2-40B4-BE49-F238E27FC236}">
+                <a16:creationId xmlns:a16="http://schemas.microsoft.com/office/drawing/2014/main" id="{10EB67D0-245C-E5B7-154D-66AD6CFCA739}"/>
+              </a:ext>
+            </a:extLst>
+          </p:cNvPr>
+          <p:cNvSpPr/>
+          <p:nvPr/>
+        </p:nvSpPr>
+        <p:spPr>
+          <a:xfrm rot="5400000">
+            <a:off x="6864136" y="1376408"/>
+            <a:ext cx="252767" cy="5658679"/>
+          </a:xfrm>
+          <a:prstGeom prst="rightBrace">
+            <a:avLst/>
+          </a:prstGeom>
+        </p:spPr>
+        <p:style>
+          <a:lnRef idx="2">
+            <a:schemeClr val="accent1"/>
+          </a:lnRef>
+          <a:fillRef idx="0">
+            <a:schemeClr val="accent1"/>
+          </a:fillRef>
+          <a:effectRef idx="1">
+            <a:schemeClr val="accent1"/>
+          </a:effectRef>
+          <a:fontRef idx="minor">
+            <a:schemeClr val="tx1"/>
+          </a:fontRef>
+        </p:style>
+        <p:txBody>
+          <a:bodyPr rtlCol="0" anchor="ctr"/>
+          <a:lstStyle/>
+          <a:p>
+            <a:pPr algn="ctr"/>
+            <a:endParaRPr lang="en-US"/>
           </a:p>
         </p:txBody>
       </p:sp>
       <p:sp>
         <p:nvSpPr>
-          <p:cNvPr id="2" name="TextBox 1">
+          <p:cNvPr id="10" name="Right Brace 9">
             <a:extLst>
               <a:ext uri="{FF2B5EF4-FFF2-40B4-BE49-F238E27FC236}">
-                <a16:creationId xmlns:a16="http://schemas.microsoft.com/office/drawing/2014/main" id="{7CF50DEA-DA45-47E8-9F05-20DF72A22AF5}"/>
+                <a16:creationId xmlns:a16="http://schemas.microsoft.com/office/drawing/2014/main" id="{A2C1B55E-8FA6-6FA1-8DFE-C51F6C50D186}"/>
+              </a:ext>
+            </a:extLst>
+          </p:cNvPr>
+          <p:cNvSpPr/>
+          <p:nvPr/>
+        </p:nvSpPr>
+        <p:spPr>
+          <a:xfrm rot="5400000">
+            <a:off x="11173960" y="3777925"/>
+            <a:ext cx="323972" cy="926858"/>
+          </a:xfrm>
+          <a:prstGeom prst="rightBrace">
+            <a:avLst/>
+          </a:prstGeom>
+        </p:spPr>
+        <p:style>
+          <a:lnRef idx="2">
+            <a:schemeClr val="accent1"/>
+          </a:lnRef>
+          <a:fillRef idx="0">
+            <a:schemeClr val="accent1"/>
+          </a:fillRef>
+          <a:effectRef idx="1">
+            <a:schemeClr val="accent1"/>
+          </a:effectRef>
+          <a:fontRef idx="minor">
+            <a:schemeClr val="tx1"/>
+          </a:fontRef>
+        </p:style>
+        <p:txBody>
+          <a:bodyPr rtlCol="0" anchor="ctr"/>
+          <a:lstStyle/>
+          <a:p>
+            <a:pPr algn="ctr"/>
+            <a:endParaRPr lang="en-US"/>
+          </a:p>
+        </p:txBody>
+      </p:sp>
+      <p:sp>
+        <p:nvSpPr>
+          <p:cNvPr id="11" name="TextBox 10">
+            <a:extLst>
+              <a:ext uri="{FF2B5EF4-FFF2-40B4-BE49-F238E27FC236}">
+                <a16:creationId xmlns:a16="http://schemas.microsoft.com/office/drawing/2014/main" id="{ABEB23EA-D0B9-B524-7C4B-FDD93399C104}"/>
               </a:ext>
             </a:extLst>
           </p:cNvPr>
@@ -24876,48 +25099,541 @@
         </p:nvSpPr>
         <p:spPr>
           <a:xfrm>
-            <a:off x="2992192" y="4314423"/>
-            <a:ext cx="5941453" cy="461665"/>
+            <a:off x="6096000" y="4403337"/>
+            <a:ext cx="2194832" cy="338554"/>
           </a:xfrm>
           <a:prstGeom prst="rect">
             <a:avLst/>
           </a:prstGeom>
-          <a:solidFill>
-            <a:schemeClr val="accent1">
-              <a:lumMod val="40000"/>
-              <a:lumOff val="60000"/>
-            </a:schemeClr>
-          </a:solidFill>
-          <a:ln w="28575">
-            <a:solidFill>
-              <a:srgbClr val="E46102"/>
-            </a:solidFill>
-          </a:ln>
+          <a:noFill/>
         </p:spPr>
         <p:txBody>
-          <a:bodyPr wrap="square" rtlCol="0">
+          <a:bodyPr wrap="none" rtlCol="0">
             <a:spAutoFit/>
           </a:bodyPr>
           <a:lstStyle/>
           <a:p>
-            <a:pPr algn="ctr"/>
-            <a:r>
-              <a:rPr lang="en-US" dirty="0"/>
-              <a:t>Lets Discuss</a:t>
-            </a:r>
+            <a:r>
+              <a:rPr lang="en-US" sz="1600" dirty="0">
+                <a:solidFill>
+                  <a:srgbClr val="E46102"/>
+                </a:solidFill>
+              </a:rPr>
+              <a:t>Features – X=</a:t>
+            </a:r>
+            <a:r>
+              <a:rPr lang="en-US" sz="1600" i="1" dirty="0">
+                <a:solidFill>
+                  <a:srgbClr val="E46102"/>
+                </a:solidFill>
+              </a:rPr>
+              <a:t>x</a:t>
+            </a:r>
+            <a:r>
+              <a:rPr lang="en-US" sz="1600" i="1" baseline="-25000" dirty="0">
+                <a:solidFill>
+                  <a:srgbClr val="E46102"/>
+                </a:solidFill>
+              </a:rPr>
+              <a:t>1</a:t>
+            </a:r>
+            <a:r>
+              <a:rPr lang="en-US" sz="1600" i="1" dirty="0">
+                <a:solidFill>
+                  <a:srgbClr val="E46102"/>
+                </a:solidFill>
+              </a:rPr>
+              <a:t>,x</a:t>
+            </a:r>
+            <a:r>
+              <a:rPr lang="en-US" sz="1600" i="1" baseline="-25000" dirty="0">
+                <a:solidFill>
+                  <a:srgbClr val="E46102"/>
+                </a:solidFill>
+              </a:rPr>
+              <a:t>2</a:t>
+            </a:r>
+            <a:r>
+              <a:rPr lang="en-US" sz="1600" i="1" dirty="0">
+                <a:solidFill>
+                  <a:srgbClr val="E46102"/>
+                </a:solidFill>
+              </a:rPr>
+              <a:t>,…</a:t>
+            </a:r>
+            <a:endParaRPr lang="en-US" i="1" dirty="0">
+              <a:solidFill>
+                <a:srgbClr val="E46102"/>
+              </a:solidFill>
+            </a:endParaRPr>
           </a:p>
         </p:txBody>
       </p:sp>
+      <p:sp>
+        <p:nvSpPr>
+          <p:cNvPr id="12" name="TextBox 11">
+            <a:extLst>
+              <a:ext uri="{FF2B5EF4-FFF2-40B4-BE49-F238E27FC236}">
+                <a16:creationId xmlns:a16="http://schemas.microsoft.com/office/drawing/2014/main" id="{F578D46F-CB2C-DF82-250F-92CFE897B453}"/>
+              </a:ext>
+            </a:extLst>
+          </p:cNvPr>
+          <p:cNvSpPr txBox="1"/>
+          <p:nvPr/>
+        </p:nvSpPr>
+        <p:spPr>
+          <a:xfrm>
+            <a:off x="11177088" y="4519300"/>
+            <a:ext cx="317716" cy="338554"/>
+          </a:xfrm>
+          <a:prstGeom prst="rect">
+            <a:avLst/>
+          </a:prstGeom>
+          <a:noFill/>
+        </p:spPr>
+        <p:txBody>
+          <a:bodyPr wrap="none" rtlCol="0">
+            <a:spAutoFit/>
+          </a:bodyPr>
+          <a:lstStyle/>
+          <a:p>
+            <a:r>
+              <a:rPr lang="en-US" sz="1600" i="1" dirty="0">
+                <a:solidFill>
+                  <a:srgbClr val="E46102"/>
+                </a:solidFill>
+              </a:rPr>
+              <a:t>x</a:t>
+            </a:r>
+            <a:r>
+              <a:rPr lang="en-US" sz="1600" i="1" baseline="-25000" dirty="0">
+                <a:solidFill>
+                  <a:srgbClr val="E46102"/>
+                </a:solidFill>
+              </a:rPr>
+              <a:t>i</a:t>
+            </a:r>
+            <a:endParaRPr lang="en-US" i="1" baseline="-25000" dirty="0">
+              <a:solidFill>
+                <a:srgbClr val="E46102"/>
+              </a:solidFill>
+            </a:endParaRPr>
+          </a:p>
+        </p:txBody>
+      </p:sp>
+      <p:sp>
+        <p:nvSpPr>
+          <p:cNvPr id="13" name="TextBox 12">
+            <a:extLst>
+              <a:ext uri="{FF2B5EF4-FFF2-40B4-BE49-F238E27FC236}">
+                <a16:creationId xmlns:a16="http://schemas.microsoft.com/office/drawing/2014/main" id="{9602E832-2519-7C4F-DAE5-788880BE46BA}"/>
+              </a:ext>
+            </a:extLst>
+          </p:cNvPr>
+          <p:cNvSpPr txBox="1"/>
+          <p:nvPr/>
+        </p:nvSpPr>
+        <p:spPr>
+          <a:xfrm>
+            <a:off x="10019253" y="1300782"/>
+            <a:ext cx="902811" cy="338554"/>
+          </a:xfrm>
+          <a:prstGeom prst="rect">
+            <a:avLst/>
+          </a:prstGeom>
+          <a:noFill/>
+        </p:spPr>
+        <p:txBody>
+          <a:bodyPr wrap="none" rtlCol="0">
+            <a:spAutoFit/>
+          </a:bodyPr>
+          <a:lstStyle/>
+          <a:p>
+            <a:r>
+              <a:rPr lang="en-US" sz="1600" dirty="0"/>
+              <a:t>Label, </a:t>
+            </a:r>
+            <a:r>
+              <a:rPr lang="en-US" sz="1600" i="1" dirty="0"/>
+              <a:t>y</a:t>
+            </a:r>
+            <a:endParaRPr lang="en-US" i="1" dirty="0"/>
+          </a:p>
+        </p:txBody>
+      </p:sp>
+      <p:cxnSp>
+        <p:nvCxnSpPr>
+          <p:cNvPr id="15" name="Straight Arrow Connector 14">
+            <a:extLst>
+              <a:ext uri="{FF2B5EF4-FFF2-40B4-BE49-F238E27FC236}">
+                <a16:creationId xmlns:a16="http://schemas.microsoft.com/office/drawing/2014/main" id="{16508A27-3FBF-FD16-B8A1-35E02CFF0405}"/>
+              </a:ext>
+            </a:extLst>
+          </p:cNvPr>
+          <p:cNvCxnSpPr/>
+          <p:nvPr/>
+        </p:nvCxnSpPr>
+        <p:spPr>
+          <a:xfrm>
+            <a:off x="10327190" y="1639336"/>
+            <a:ext cx="0" cy="679443"/>
+          </a:xfrm>
+          <a:prstGeom prst="straightConnector1">
+            <a:avLst/>
+          </a:prstGeom>
+          <a:ln>
+            <a:solidFill>
+              <a:schemeClr val="tx1"/>
+            </a:solidFill>
+            <a:tailEnd type="triangle"/>
+          </a:ln>
+        </p:spPr>
+        <p:style>
+          <a:lnRef idx="2">
+            <a:schemeClr val="accent1"/>
+          </a:lnRef>
+          <a:fillRef idx="0">
+            <a:schemeClr val="accent1"/>
+          </a:fillRef>
+          <a:effectRef idx="1">
+            <a:schemeClr val="accent1"/>
+          </a:effectRef>
+          <a:fontRef idx="minor">
+            <a:schemeClr val="tx1"/>
+          </a:fontRef>
+        </p:style>
+      </p:cxnSp>
+      <p:pic>
+        <p:nvPicPr>
+          <p:cNvPr id="1026" name="Picture 2" descr="Feature matrix and label | Download Scientific Diagram">
+            <a:extLst>
+              <a:ext uri="{FF2B5EF4-FFF2-40B4-BE49-F238E27FC236}">
+                <a16:creationId xmlns:a16="http://schemas.microsoft.com/office/drawing/2014/main" id="{5A5DBE8E-0C95-BE80-70BD-D1C5A183DA76}"/>
+              </a:ext>
+            </a:extLst>
+          </p:cNvPr>
+          <p:cNvPicPr>
+            <a:picLocks noChangeAspect="1" noChangeArrowheads="1"/>
+          </p:cNvPicPr>
+          <p:nvPr/>
+        </p:nvPicPr>
+        <p:blipFill>
+          <a:blip r:embed="rId4">
+            <a:extLst>
+              <a:ext uri="{BEBA8EAE-BF5A-486C-A8C5-ECC9F3942E4B}">
+                <a14:imgProps xmlns:a14="http://schemas.microsoft.com/office/drawing/2010/main">
+                  <a14:imgLayer r:embed="rId5">
+                    <a14:imgEffect>
+                      <a14:sharpenSoften amount="50000"/>
+                    </a14:imgEffect>
+                    <a14:imgEffect>
+                      <a14:saturation sat="66000"/>
+                    </a14:imgEffect>
+                  </a14:imgLayer>
+                </a14:imgProps>
+              </a:ext>
+              <a:ext uri="{28A0092B-C50C-407E-A947-70E740481C1C}">
+                <a14:useLocalDpi xmlns:a14="http://schemas.microsoft.com/office/drawing/2010/main" val="0"/>
+              </a:ext>
+            </a:extLst>
+          </a:blip>
+          <a:srcRect/>
+          <a:stretch>
+            <a:fillRect/>
+          </a:stretch>
+        </p:blipFill>
+        <p:spPr bwMode="auto">
+          <a:xfrm>
+            <a:off x="8592553" y="4514641"/>
+            <a:ext cx="2036358" cy="2151624"/>
+          </a:xfrm>
+          <a:prstGeom prst="rect">
+            <a:avLst/>
+          </a:prstGeom>
+          <a:noFill/>
+          <a:extLst>
+            <a:ext uri="{909E8E84-426E-40DD-AFC4-6F175D3DCCD1}">
+              <a14:hiddenFill xmlns:a14="http://schemas.microsoft.com/office/drawing/2010/main">
+                <a:solidFill>
+                  <a:srgbClr val="FFFFFF"/>
+                </a:solidFill>
+              </a14:hiddenFill>
+            </a:ext>
+          </a:extLst>
+        </p:spPr>
+      </p:pic>
     </p:spTree>
     <p:extLst>
       <p:ext uri="{BB962C8B-B14F-4D97-AF65-F5344CB8AC3E}">
-        <p14:creationId xmlns:p14="http://schemas.microsoft.com/office/powerpoint/2010/main" val="1919109643"/>
+        <p14:creationId xmlns:p14="http://schemas.microsoft.com/office/powerpoint/2010/main" val="2923327648"/>
       </p:ext>
     </p:extLst>
   </p:cSld>
   <p:clrMapOvr>
     <a:masterClrMapping/>
   </p:clrMapOvr>
+  <p:timing>
+    <p:tnLst>
+      <p:par>
+        <p:cTn id="1" dur="indefinite" restart="never" nodeType="tmRoot">
+          <p:childTnLst>
+            <p:seq concurrent="1" nextAc="seek">
+              <p:cTn id="2" dur="indefinite" nodeType="mainSeq">
+                <p:childTnLst>
+                  <p:par>
+                    <p:cTn id="3" fill="hold">
+                      <p:stCondLst>
+                        <p:cond delay="indefinite"/>
+                      </p:stCondLst>
+                      <p:childTnLst>
+                        <p:par>
+                          <p:cTn id="4" fill="hold">
+                            <p:stCondLst>
+                              <p:cond delay="0"/>
+                            </p:stCondLst>
+                            <p:childTnLst>
+                              <p:par>
+                                <p:cTn id="5" presetID="1" presetClass="entr" presetSubtype="0" fill="hold" grpId="0" nodeType="clickEffect">
+                                  <p:stCondLst>
+                                    <p:cond delay="0"/>
+                                  </p:stCondLst>
+                                  <p:childTnLst>
+                                    <p:set>
+                                      <p:cBhvr>
+                                        <p:cTn id="6" dur="1" fill="hold">
+                                          <p:stCondLst>
+                                            <p:cond delay="0"/>
+                                          </p:stCondLst>
+                                        </p:cTn>
+                                        <p:tgtEl>
+                                          <p:spTgt spid="13"/>
+                                        </p:tgtEl>
+                                        <p:attrNameLst>
+                                          <p:attrName>style.visibility</p:attrName>
+                                        </p:attrNameLst>
+                                      </p:cBhvr>
+                                      <p:to>
+                                        <p:strVal val="visible"/>
+                                      </p:to>
+                                    </p:set>
+                                  </p:childTnLst>
+                                </p:cTn>
+                              </p:par>
+                              <p:par>
+                                <p:cTn id="7" presetID="1" presetClass="entr" presetSubtype="0" fill="hold" nodeType="withEffect">
+                                  <p:stCondLst>
+                                    <p:cond delay="0"/>
+                                  </p:stCondLst>
+                                  <p:childTnLst>
+                                    <p:set>
+                                      <p:cBhvr>
+                                        <p:cTn id="8" dur="1" fill="hold">
+                                          <p:stCondLst>
+                                            <p:cond delay="0"/>
+                                          </p:stCondLst>
+                                        </p:cTn>
+                                        <p:tgtEl>
+                                          <p:spTgt spid="15"/>
+                                        </p:tgtEl>
+                                        <p:attrNameLst>
+                                          <p:attrName>style.visibility</p:attrName>
+                                        </p:attrNameLst>
+                                      </p:cBhvr>
+                                      <p:to>
+                                        <p:strVal val="visible"/>
+                                      </p:to>
+                                    </p:set>
+                                  </p:childTnLst>
+                                </p:cTn>
+                              </p:par>
+                              <p:par>
+                                <p:cTn id="9" presetID="1" presetClass="entr" presetSubtype="0" fill="hold" grpId="0" nodeType="withEffect">
+                                  <p:stCondLst>
+                                    <p:cond delay="0"/>
+                                  </p:stCondLst>
+                                  <p:childTnLst>
+                                    <p:set>
+                                      <p:cBhvr>
+                                        <p:cTn id="10" dur="1" fill="hold">
+                                          <p:stCondLst>
+                                            <p:cond delay="0"/>
+                                          </p:stCondLst>
+                                        </p:cTn>
+                                        <p:tgtEl>
+                                          <p:spTgt spid="9"/>
+                                        </p:tgtEl>
+                                        <p:attrNameLst>
+                                          <p:attrName>style.visibility</p:attrName>
+                                        </p:attrNameLst>
+                                      </p:cBhvr>
+                                      <p:to>
+                                        <p:strVal val="visible"/>
+                                      </p:to>
+                                    </p:set>
+                                  </p:childTnLst>
+                                </p:cTn>
+                              </p:par>
+                              <p:par>
+                                <p:cTn id="11" presetID="1" presetClass="entr" presetSubtype="0" fill="hold" grpId="0" nodeType="withEffect">
+                                  <p:stCondLst>
+                                    <p:cond delay="0"/>
+                                  </p:stCondLst>
+                                  <p:childTnLst>
+                                    <p:set>
+                                      <p:cBhvr>
+                                        <p:cTn id="12" dur="1" fill="hold">
+                                          <p:stCondLst>
+                                            <p:cond delay="0"/>
+                                          </p:stCondLst>
+                                        </p:cTn>
+                                        <p:tgtEl>
+                                          <p:spTgt spid="11"/>
+                                        </p:tgtEl>
+                                        <p:attrNameLst>
+                                          <p:attrName>style.visibility</p:attrName>
+                                        </p:attrNameLst>
+                                      </p:cBhvr>
+                                      <p:to>
+                                        <p:strVal val="visible"/>
+                                      </p:to>
+                                    </p:set>
+                                  </p:childTnLst>
+                                </p:cTn>
+                              </p:par>
+                              <p:par>
+                                <p:cTn id="13" presetID="1" presetClass="entr" presetSubtype="0" fill="hold" grpId="0" nodeType="withEffect">
+                                  <p:stCondLst>
+                                    <p:cond delay="0"/>
+                                  </p:stCondLst>
+                                  <p:childTnLst>
+                                    <p:set>
+                                      <p:cBhvr>
+                                        <p:cTn id="14" dur="1" fill="hold">
+                                          <p:stCondLst>
+                                            <p:cond delay="0"/>
+                                          </p:stCondLst>
+                                        </p:cTn>
+                                        <p:tgtEl>
+                                          <p:spTgt spid="10"/>
+                                        </p:tgtEl>
+                                        <p:attrNameLst>
+                                          <p:attrName>style.visibility</p:attrName>
+                                        </p:attrNameLst>
+                                      </p:cBhvr>
+                                      <p:to>
+                                        <p:strVal val="visible"/>
+                                      </p:to>
+                                    </p:set>
+                                  </p:childTnLst>
+                                </p:cTn>
+                              </p:par>
+                              <p:par>
+                                <p:cTn id="15" presetID="1" presetClass="entr" presetSubtype="0" fill="hold" grpId="0" nodeType="withEffect">
+                                  <p:stCondLst>
+                                    <p:cond delay="0"/>
+                                  </p:stCondLst>
+                                  <p:childTnLst>
+                                    <p:set>
+                                      <p:cBhvr>
+                                        <p:cTn id="16" dur="1" fill="hold">
+                                          <p:stCondLst>
+                                            <p:cond delay="0"/>
+                                          </p:stCondLst>
+                                        </p:cTn>
+                                        <p:tgtEl>
+                                          <p:spTgt spid="12"/>
+                                        </p:tgtEl>
+                                        <p:attrNameLst>
+                                          <p:attrName>style.visibility</p:attrName>
+                                        </p:attrNameLst>
+                                      </p:cBhvr>
+                                      <p:to>
+                                        <p:strVal val="visible"/>
+                                      </p:to>
+                                    </p:set>
+                                  </p:childTnLst>
+                                </p:cTn>
+                              </p:par>
+                            </p:childTnLst>
+                          </p:cTn>
+                        </p:par>
+                      </p:childTnLst>
+                    </p:cTn>
+                  </p:par>
+                  <p:par>
+                    <p:cTn id="17" fill="hold">
+                      <p:stCondLst>
+                        <p:cond delay="indefinite"/>
+                      </p:stCondLst>
+                      <p:childTnLst>
+                        <p:par>
+                          <p:cTn id="18" fill="hold">
+                            <p:stCondLst>
+                              <p:cond delay="0"/>
+                            </p:stCondLst>
+                            <p:childTnLst>
+                              <p:par>
+                                <p:cTn id="19" presetID="1" presetClass="entr" presetSubtype="0" fill="hold" nodeType="clickEffect">
+                                  <p:stCondLst>
+                                    <p:cond delay="0"/>
+                                  </p:stCondLst>
+                                  <p:childTnLst>
+                                    <p:set>
+                                      <p:cBhvr>
+                                        <p:cTn id="20" dur="1" fill="hold">
+                                          <p:stCondLst>
+                                            <p:cond delay="0"/>
+                                          </p:stCondLst>
+                                        </p:cTn>
+                                        <p:tgtEl>
+                                          <p:spTgt spid="1026"/>
+                                        </p:tgtEl>
+                                        <p:attrNameLst>
+                                          <p:attrName>style.visibility</p:attrName>
+                                        </p:attrNameLst>
+                                      </p:cBhvr>
+                                      <p:to>
+                                        <p:strVal val="visible"/>
+                                      </p:to>
+                                    </p:set>
+                                  </p:childTnLst>
+                                </p:cTn>
+                              </p:par>
+                            </p:childTnLst>
+                          </p:cTn>
+                        </p:par>
+                      </p:childTnLst>
+                    </p:cTn>
+                  </p:par>
+                </p:childTnLst>
+              </p:cTn>
+              <p:prevCondLst>
+                <p:cond evt="onPrev" delay="0">
+                  <p:tgtEl>
+                    <p:sldTgt/>
+                  </p:tgtEl>
+                </p:cond>
+              </p:prevCondLst>
+              <p:nextCondLst>
+                <p:cond evt="onNext" delay="0">
+                  <p:tgtEl>
+                    <p:sldTgt/>
+                  </p:tgtEl>
+                </p:cond>
+              </p:nextCondLst>
+            </p:seq>
+          </p:childTnLst>
+        </p:cTn>
+      </p:par>
+    </p:tnLst>
+    <p:bldLst>
+      <p:bldP spid="9" grpId="0" animBg="1"/>
+      <p:bldP spid="10" grpId="0" animBg="1"/>
+      <p:bldP spid="11" grpId="0"/>
+      <p:bldP spid="12" grpId="0"/>
+      <p:bldP spid="13" grpId="0"/>
+    </p:bldLst>
+  </p:timing>
 </p:sld>
 </file>
 
@@ -24969,7 +25685,7 @@
                   <a:srgbClr val="E46102"/>
                 </a:solidFill>
               </a:rPr>
-              <a:t>Build a model - 2</a:t>
+              <a:t>Build a model</a:t>
             </a:r>
             <a:endParaRPr sz="4000" b="1" dirty="0">
               <a:solidFill>
@@ -25004,87 +25720,122 @@
           </a:bodyPr>
           <a:lstStyle/>
           <a:p>
-            <a:pPr lvl="0" algn="ctr">
-              <a:defRPr/>
-            </a:pPr>
-            <a:r>
-              <a:rPr lang="en-US" sz="2000" b="1" u="sng" dirty="0"/>
-              <a:t>One approach</a:t>
-            </a:r>
-          </a:p>
-          <a:p>
-            <a:pPr lvl="0">
-              <a:defRPr/>
+            <a:pPr marL="609585" indent="-507987">
+              <a:buSzPct val="100000"/>
+              <a:buChar char="●"/>
             </a:pPr>
             <a:endParaRPr lang="en-US" sz="2000" dirty="0"/>
           </a:p>
           <a:p>
-            <a:pPr lvl="0">
-              <a:defRPr/>
+            <a:pPr marL="558798" indent="-457200">
+              <a:buSzPct val="100000"/>
+              <a:buAutoNum type="arabicPeriod" startAt="3"/>
             </a:pPr>
             <a:r>
               <a:rPr lang="en-US" sz="2000" dirty="0"/>
-              <a:t>Supervised learning task - since you are given labeled training examples (each instance comes with the expected output, i.e., the district’s median housing price)</a:t>
-            </a:r>
-          </a:p>
-          <a:p>
-            <a:pPr lvl="0">
-              <a:defRPr/>
+              <a:t>Frame the Problem - Design a model that takes the features as input and predicts the median housing price. </a:t>
+            </a:r>
+          </a:p>
+          <a:p>
+            <a:pPr marL="558798" indent="-457200">
+              <a:buSzPct val="100000"/>
+              <a:buAutoNum type="arabicPeriod" startAt="3"/>
             </a:pPr>
             <a:endParaRPr lang="en-US" sz="2000" dirty="0"/>
           </a:p>
           <a:p>
-            <a:pPr lvl="0">
-              <a:defRPr/>
+            <a:pPr marL="558798" indent="-457200">
+              <a:buSzPct val="100000"/>
+              <a:buAutoNum type="arabicPeriod" startAt="3"/>
             </a:pPr>
             <a:r>
               <a:rPr lang="en-US" sz="2000" dirty="0"/>
-              <a:t>Regression task, since you are asked to predict a value. </a:t>
-            </a:r>
-          </a:p>
-          <a:p>
-            <a:pPr lvl="0">
-              <a:defRPr/>
+              <a:t>Start designing your system – </a:t>
+            </a:r>
+          </a:p>
+          <a:p>
+            <a:pPr marL="1168383" lvl="1" indent="-457200">
+              <a:buSzPct val="100000"/>
+              <a:buFont typeface="+mj-lt"/>
+              <a:buAutoNum type="arabicPeriod"/>
+            </a:pPr>
+            <a:r>
+              <a:rPr lang="en-US" sz="2000" dirty="0"/>
+              <a:t>Is it supervised, unsupervised, or reinforcement learning?</a:t>
+            </a:r>
+          </a:p>
+          <a:p>
+            <a:pPr marL="1168383" lvl="1" indent="-457200">
+              <a:buSzPct val="100000"/>
+              <a:buFont typeface="+mj-lt"/>
+              <a:buAutoNum type="arabicPeriod"/>
+            </a:pPr>
+            <a:r>
+              <a:rPr lang="en-US" sz="2000" dirty="0"/>
+              <a:t>Is it a classification, regression or some other task?</a:t>
+            </a:r>
+          </a:p>
+          <a:p>
+            <a:pPr marL="1168383" lvl="1" indent="-457200">
+              <a:buSzPct val="100000"/>
+              <a:buFont typeface="+mj-lt"/>
+              <a:buAutoNum type="arabicPeriod"/>
+            </a:pPr>
+            <a:r>
+              <a:rPr lang="en-US" sz="2000" dirty="0"/>
+              <a:t>Should you use batch or online learning?</a:t>
+            </a:r>
+          </a:p>
+          <a:p>
+            <a:pPr marL="101598">
+              <a:buSzPct val="100000"/>
             </a:pPr>
             <a:endParaRPr lang="en-US" sz="2000" dirty="0"/>
           </a:p>
-          <a:p>
-            <a:pPr lvl="0">
-              <a:defRPr/>
-            </a:pPr>
-            <a:r>
-              <a:rPr lang="en-US" sz="2000" dirty="0"/>
-              <a:t>More specifically, this is a multiple regression problem since the system will use multiple features to make a prediction (it will use the district’s population, the median income, etc.). </a:t>
-            </a:r>
-          </a:p>
-          <a:p>
-            <a:pPr lvl="0">
-              <a:defRPr/>
-            </a:pPr>
-            <a:endParaRPr lang="en-US" sz="2000" dirty="0"/>
-          </a:p>
-          <a:p>
-            <a:pPr lvl="0">
-              <a:defRPr/>
-            </a:pPr>
-            <a:r>
-              <a:rPr lang="en-US" sz="2000" dirty="0"/>
-              <a:t>It is also a univariate regression problem since we are only trying to predict a single value for each district. </a:t>
-            </a:r>
-          </a:p>
-          <a:p>
-            <a:pPr lvl="0">
-              <a:defRPr/>
-            </a:pPr>
-            <a:endParaRPr lang="en-US" sz="2000" dirty="0"/>
-          </a:p>
-          <a:p>
-            <a:pPr lvl="0">
-              <a:defRPr/>
-            </a:pPr>
-            <a:r>
-              <a:rPr lang="en-US" sz="2000" dirty="0"/>
-              <a:t>No continuous flow of data coming in the system, there is no particular need to adjust to changing data rapidly, and the data is small enough to fit in memory, so plain batch learning should do just fine.</a:t>
+        </p:txBody>
+      </p:sp>
+      <p:sp>
+        <p:nvSpPr>
+          <p:cNvPr id="2" name="TextBox 1">
+            <a:extLst>
+              <a:ext uri="{FF2B5EF4-FFF2-40B4-BE49-F238E27FC236}">
+                <a16:creationId xmlns:a16="http://schemas.microsoft.com/office/drawing/2014/main" id="{7CF50DEA-DA45-47E8-9F05-20DF72A22AF5}"/>
+              </a:ext>
+            </a:extLst>
+          </p:cNvPr>
+          <p:cNvSpPr txBox="1"/>
+          <p:nvPr/>
+        </p:nvSpPr>
+        <p:spPr>
+          <a:xfrm>
+            <a:off x="2992192" y="4314423"/>
+            <a:ext cx="5941453" cy="461665"/>
+          </a:xfrm>
+          <a:prstGeom prst="rect">
+            <a:avLst/>
+          </a:prstGeom>
+          <a:solidFill>
+            <a:schemeClr val="accent1">
+              <a:lumMod val="40000"/>
+              <a:lumOff val="60000"/>
+            </a:schemeClr>
+          </a:solidFill>
+          <a:ln w="28575">
+            <a:solidFill>
+              <a:srgbClr val="E46102"/>
+            </a:solidFill>
+          </a:ln>
+        </p:spPr>
+        <p:txBody>
+          <a:bodyPr wrap="square" rtlCol="0">
+            <a:spAutoFit/>
+          </a:bodyPr>
+          <a:lstStyle/>
+          <a:p>
+            <a:pPr algn="ctr"/>
+            <a:r>
+              <a:rPr lang="en-US" dirty="0"/>
+              <a:t>Lets Discuss</a:t>
             </a:r>
           </a:p>
         </p:txBody>
@@ -25092,7 +25843,7 @@
     </p:spTree>
     <p:extLst>
       <p:ext uri="{BB962C8B-B14F-4D97-AF65-F5344CB8AC3E}">
-        <p14:creationId xmlns:p14="http://schemas.microsoft.com/office/powerpoint/2010/main" val="1025045661"/>
+        <p14:creationId xmlns:p14="http://schemas.microsoft.com/office/powerpoint/2010/main" val="1919109643"/>
       </p:ext>
     </p:extLst>
   </p:cSld>
@@ -25150,7 +25901,7 @@
                   <a:srgbClr val="E46102"/>
                 </a:solidFill>
               </a:rPr>
-              <a:t>Build a model - 2</a:t>
+              <a:t>Build a model</a:t>
             </a:r>
             <a:endParaRPr sz="4000" b="1" dirty="0">
               <a:solidFill>
@@ -25185,131 +25936,95 @@
           </a:bodyPr>
           <a:lstStyle/>
           <a:p>
-            <a:pPr marL="609585" indent="-507987">
-              <a:buSzPct val="100000"/>
-              <a:buChar char="●"/>
+            <a:pPr lvl="0" algn="ctr">
+              <a:defRPr/>
+            </a:pPr>
+            <a:r>
+              <a:rPr lang="en-US" sz="2000" b="1" u="sng" dirty="0"/>
+              <a:t>One approach</a:t>
+            </a:r>
+          </a:p>
+          <a:p>
+            <a:pPr lvl="0">
+              <a:defRPr/>
             </a:pPr>
             <a:endParaRPr lang="en-US" sz="2000" dirty="0"/>
           </a:p>
           <a:p>
-            <a:pPr marL="558798" indent="-457200">
-              <a:buSzPct val="100000"/>
-              <a:buFont typeface="+mj-lt"/>
-              <a:buAutoNum type="arabicPeriod"/>
+            <a:pPr lvl="0">
+              <a:defRPr/>
             </a:pPr>
             <a:r>
               <a:rPr lang="en-US" sz="2000" dirty="0"/>
-              <a:t>Frame the Problem.</a:t>
-            </a:r>
-          </a:p>
-          <a:p>
-            <a:pPr marL="558798" indent="-457200">
-              <a:buSzPct val="100000"/>
-              <a:buFont typeface="+mj-lt"/>
-              <a:buAutoNum type="arabicPeriod"/>
+              <a:t>Supervised learning task - since you are given labeled training examples (each instance comes with the expected output, i.e., the district’s median housing price)</a:t>
+            </a:r>
+          </a:p>
+          <a:p>
+            <a:pPr lvl="0">
+              <a:defRPr/>
             </a:pPr>
             <a:endParaRPr lang="en-US" sz="2000" dirty="0"/>
           </a:p>
           <a:p>
-            <a:pPr marL="558798" indent="-457200">
-              <a:buSzPct val="100000"/>
-              <a:buFont typeface="+mj-lt"/>
-              <a:buAutoNum type="arabicPeriod"/>
+            <a:pPr lvl="0">
+              <a:defRPr/>
             </a:pPr>
             <a:r>
               <a:rPr lang="en-US" sz="2000" dirty="0"/>
-              <a:t>What is the current solution?</a:t>
-            </a:r>
-          </a:p>
-          <a:p>
-            <a:pPr marL="558798" indent="-457200">
-              <a:buSzPct val="100000"/>
-              <a:buFont typeface="+mj-lt"/>
-              <a:buAutoNum type="arabicPeriod"/>
+              <a:t>Regression task, since you are asked to predict a value. </a:t>
+            </a:r>
+          </a:p>
+          <a:p>
+            <a:pPr lvl="0">
+              <a:defRPr/>
             </a:pPr>
             <a:endParaRPr lang="en-US" sz="2000" dirty="0"/>
           </a:p>
           <a:p>
-            <a:pPr marL="558798" indent="-457200">
-              <a:buSzPct val="100000"/>
-              <a:buFont typeface="+mj-lt"/>
-              <a:buAutoNum type="arabicPeriod"/>
+            <a:pPr lvl="0">
+              <a:defRPr/>
             </a:pPr>
             <a:r>
               <a:rPr lang="en-US" sz="2000" dirty="0"/>
-              <a:t>Start designing your system – </a:t>
-            </a:r>
-          </a:p>
-          <a:p>
-            <a:pPr marL="1168383" lvl="1" indent="-457200">
-              <a:buSzPct val="100000"/>
-              <a:buFont typeface="+mj-lt"/>
-              <a:buAutoNum type="arabicPeriod"/>
+              <a:t>More specifically, this is a multiple regression problem since the system will use multiple features to make a prediction (it will use the district’s population, the median income, etc.). </a:t>
+            </a:r>
+          </a:p>
+          <a:p>
+            <a:pPr lvl="0">
+              <a:defRPr/>
+            </a:pPr>
+            <a:endParaRPr lang="en-US" sz="2000" dirty="0"/>
+          </a:p>
+          <a:p>
+            <a:pPr lvl="0">
+              <a:defRPr/>
             </a:pPr>
             <a:r>
               <a:rPr lang="en-US" sz="2000" dirty="0"/>
-              <a:t>Is it supervised, unsupervised, or reinforcement learning?</a:t>
-            </a:r>
-          </a:p>
-          <a:p>
-            <a:pPr marL="1168383" lvl="1" indent="-457200">
-              <a:buSzPct val="100000"/>
-              <a:buFont typeface="+mj-lt"/>
-              <a:buAutoNum type="arabicPeriod"/>
+              <a:t>It is also a univariate regression problem since we are only trying to predict a single value for each district. </a:t>
+            </a:r>
+          </a:p>
+          <a:p>
+            <a:pPr lvl="0">
+              <a:defRPr/>
+            </a:pPr>
+            <a:endParaRPr lang="en-US" sz="2000" dirty="0"/>
+          </a:p>
+          <a:p>
+            <a:pPr lvl="0">
+              <a:defRPr/>
             </a:pPr>
             <a:r>
               <a:rPr lang="en-US" sz="2000" dirty="0"/>
-              <a:t>Is it a classification, regression or some other task?</a:t>
-            </a:r>
-          </a:p>
-          <a:p>
-            <a:pPr marL="1168383" lvl="1" indent="-457200">
-              <a:buSzPct val="100000"/>
-              <a:buFont typeface="+mj-lt"/>
-              <a:buAutoNum type="arabicPeriod"/>
-            </a:pPr>
-            <a:r>
-              <a:rPr lang="en-US" sz="2000" dirty="0"/>
-              <a:t>Should you use batch or online learning?</a:t>
-            </a:r>
-          </a:p>
-          <a:p>
-            <a:pPr marL="711183" lvl="1">
-              <a:buSzPct val="100000"/>
-            </a:pPr>
-            <a:endParaRPr lang="en-US" sz="2000" dirty="0"/>
-          </a:p>
-          <a:p>
-            <a:pPr marL="558798" indent="-457200">
-              <a:buSzPct val="100000"/>
-              <a:buFont typeface="+mj-lt"/>
-              <a:buAutoNum type="arabicPeriod"/>
-            </a:pPr>
-            <a:r>
-              <a:rPr lang="en-US" sz="2000" dirty="0"/>
-              <a:t>Select a Model Performance measure</a:t>
-            </a:r>
-          </a:p>
-          <a:p>
-            <a:pPr marL="1777968" lvl="2" indent="-457200">
-              <a:buSzPct val="100000"/>
-              <a:buFont typeface="Arial" panose="020B0604020202020204" pitchFamily="34" charset="0"/>
-              <a:buChar char="•"/>
-            </a:pPr>
-            <a:endParaRPr lang="en-US" sz="2000" dirty="0"/>
-          </a:p>
-          <a:p>
-            <a:pPr marL="101598">
-              <a:buSzPct val="100000"/>
-            </a:pPr>
-            <a:endParaRPr lang="en-US" sz="2000" dirty="0"/>
+              <a:t>No continuous flow of data coming in the system, there is no particular need to adjust to changing data rapidly, and the data is small enough to fit in memory, so plain batch learning should do just fine.</a:t>
+            </a:r>
           </a:p>
         </p:txBody>
       </p:sp>
     </p:spTree>
     <p:extLst>
       <p:ext uri="{BB962C8B-B14F-4D97-AF65-F5344CB8AC3E}">
-        <p14:creationId xmlns:p14="http://schemas.microsoft.com/office/powerpoint/2010/main" val="2179181233"/>
+        <p14:creationId xmlns:p14="http://schemas.microsoft.com/office/powerpoint/2010/main" val="1025045661"/>
       </p:ext>
     </p:extLst>
   </p:cSld>
@@ -25367,7 +26082,7 @@
                   <a:srgbClr val="E46102"/>
                 </a:solidFill>
               </a:rPr>
-              <a:t>Build a model - 2</a:t>
+              <a:t>Model Performance</a:t>
             </a:r>
             <a:endParaRPr sz="4000" b="1" dirty="0">
               <a:solidFill>
@@ -25385,8 +26100,8 @@
         </p:nvSpPr>
         <p:spPr>
           <a:xfrm>
-            <a:off x="1034394" y="1137532"/>
-            <a:ext cx="10252364" cy="5198874"/>
+            <a:off x="111436" y="1137532"/>
+            <a:ext cx="10140928" cy="5198874"/>
           </a:xfrm>
           <a:prstGeom prst="rect">
             <a:avLst/>
@@ -25402,14 +26117,12 @@
           </a:bodyPr>
           <a:lstStyle/>
           <a:p>
-            <a:pPr marL="558798" indent="-457200">
+            <a:pPr marL="101598">
               <a:buSzPct val="100000"/>
-              <a:buFont typeface="+mj-lt"/>
-              <a:buAutoNum type="arabicPeriod" startAt="4"/>
             </a:pPr>
             <a:r>
               <a:rPr lang="en-US" sz="2000" dirty="0"/>
-              <a:t>Select a Model Performance measure</a:t>
+              <a:t>5.	Select a Model Performance measure</a:t>
             </a:r>
           </a:p>
           <a:p>
@@ -25419,8 +26132,12 @@
               <a:buAutoNum type="alphaLcParenR"/>
             </a:pPr>
             <a:r>
+              <a:rPr lang="en-US" sz="2000" b="1" dirty="0"/>
+              <a:t>Root mean square error (RMSE) </a:t>
+            </a:r>
+            <a:r>
               <a:rPr lang="en-US" sz="2000" dirty="0"/>
-              <a:t>Root mean square error (RMSE) – gives you an idea of how much error a system typically makes in its predictions</a:t>
+              <a:t>– gives you an idea of how much error a system typically makes in its predictions</a:t>
             </a:r>
           </a:p>
           <a:p>
@@ -25556,64 +26273,9 @@
             </a:r>
             <a:r>
               <a:rPr lang="en-US" sz="2000" dirty="0"/>
-              <a:t> is a matrix containing all the feature values (excluding labels) of all instances in the dataset. There is one row per instance and the </a:t>
-            </a:r>
-            <a:r>
-              <a:rPr lang="en-US" sz="2000" i="1" dirty="0" err="1"/>
-              <a:t>i</a:t>
-            </a:r>
-            <a:r>
-              <a:rPr lang="en-US" sz="2000" i="1" baseline="30000" dirty="0" err="1"/>
-              <a:t>th</a:t>
-            </a:r>
-            <a:r>
-              <a:rPr lang="en-US" sz="2000" dirty="0"/>
-              <a:t> row is equal to the transpose of </a:t>
-            </a:r>
-            <a:r>
-              <a:rPr lang="en-US" sz="2000" b="1" dirty="0"/>
-              <a:t>x</a:t>
-            </a:r>
-            <a:r>
-              <a:rPr lang="en-US" sz="2000" i="1" baseline="30000" dirty="0"/>
-              <a:t>(</a:t>
-            </a:r>
-            <a:r>
-              <a:rPr lang="en-US" sz="2000" i="1" baseline="30000" dirty="0" err="1"/>
-              <a:t>i</a:t>
-            </a:r>
-            <a:r>
-              <a:rPr lang="en-US" sz="2000" i="1" baseline="30000" dirty="0"/>
-              <a:t>)</a:t>
-            </a:r>
-            <a:r>
-              <a:rPr lang="en-US" sz="2000" dirty="0"/>
-              <a:t>, noted (</a:t>
-            </a:r>
-            <a:r>
-              <a:rPr lang="en-US" sz="2000" b="1" dirty="0"/>
-              <a:t>x</a:t>
-            </a:r>
-            <a:r>
-              <a:rPr lang="en-US" sz="2000" i="1" baseline="30000" dirty="0"/>
-              <a:t>(</a:t>
-            </a:r>
-            <a:r>
-              <a:rPr lang="en-US" sz="2000" i="1" baseline="30000" dirty="0" err="1"/>
-              <a:t>i</a:t>
-            </a:r>
-            <a:r>
-              <a:rPr lang="en-US" sz="2000" i="1" baseline="30000" dirty="0"/>
-              <a:t>)</a:t>
-            </a:r>
-            <a:r>
-              <a:rPr lang="en-US" sz="2000" dirty="0"/>
-              <a:t>)</a:t>
-            </a:r>
-            <a:r>
-              <a:rPr lang="en-US" sz="2000" baseline="30000" dirty="0"/>
-              <a:t>T.4</a:t>
-            </a:r>
+              <a:t> is a matrix containing all the feature values (excluding labels) of all instances in the dataset.</a:t>
+            </a:r>
+            <a:endParaRPr lang="en-US" sz="2000" baseline="30000" dirty="0"/>
           </a:p>
           <a:p>
             <a:pPr marL="1777968" lvl="2" indent="-457200">
@@ -25675,6 +26337,65 @@
           <a:prstGeom prst="rect">
             <a:avLst/>
           </a:prstGeom>
+        </p:spPr>
+      </p:pic>
+      <p:pic>
+        <p:nvPicPr>
+          <p:cNvPr id="2" name="Picture 2" descr="Feature matrix and label | Download Scientific Diagram">
+            <a:extLst>
+              <a:ext uri="{FF2B5EF4-FFF2-40B4-BE49-F238E27FC236}">
+                <a16:creationId xmlns:a16="http://schemas.microsoft.com/office/drawing/2014/main" id="{FEBD7C1C-2E4B-7678-18AC-54FFBC443AE1}"/>
+              </a:ext>
+            </a:extLst>
+          </p:cNvPr>
+          <p:cNvPicPr>
+            <a:picLocks noChangeAspect="1" noChangeArrowheads="1"/>
+          </p:cNvPicPr>
+          <p:nvPr/>
+        </p:nvPicPr>
+        <p:blipFill>
+          <a:blip r:embed="rId4">
+            <a:extLst>
+              <a:ext uri="{BEBA8EAE-BF5A-486C-A8C5-ECC9F3942E4B}">
+                <a14:imgProps xmlns:a14="http://schemas.microsoft.com/office/drawing/2010/main">
+                  <a14:imgLayer r:embed="rId5">
+                    <a14:imgEffect>
+                      <a14:sharpenSoften amount="50000"/>
+                    </a14:imgEffect>
+                    <a14:imgEffect>
+                      <a14:saturation sat="66000"/>
+                    </a14:imgEffect>
+                  </a14:imgLayer>
+                </a14:imgProps>
+              </a:ext>
+              <a:ext uri="{28A0092B-C50C-407E-A947-70E740481C1C}">
+                <a14:useLocalDpi xmlns:a14="http://schemas.microsoft.com/office/drawing/2010/main" val="0"/>
+              </a:ext>
+            </a:extLst>
+          </a:blip>
+          <a:srcRect/>
+          <a:stretch>
+            <a:fillRect/>
+          </a:stretch>
+        </p:blipFill>
+        <p:spPr bwMode="auto">
+          <a:xfrm>
+            <a:off x="10033425" y="951012"/>
+            <a:ext cx="2036358" cy="2151624"/>
+          </a:xfrm>
+          <a:prstGeom prst="rect">
+            <a:avLst/>
+          </a:prstGeom>
+          <a:noFill/>
+          <a:extLst>
+            <a:ext uri="{909E8E84-426E-40DD-AFC4-6F175D3DCCD1}">
+              <a14:hiddenFill xmlns:a14="http://schemas.microsoft.com/office/drawing/2010/main">
+                <a:solidFill>
+                  <a:srgbClr val="FFFFFF"/>
+                </a:solidFill>
+              </a14:hiddenFill>
+            </a:ext>
+          </a:extLst>
         </p:spPr>
       </p:pic>
     </p:spTree>
@@ -26165,7 +26886,7 @@
                   <a:srgbClr val="E46102"/>
                 </a:solidFill>
               </a:rPr>
-              <a:t>Build a model - 2</a:t>
+              <a:t>Model Performance</a:t>
             </a:r>
             <a:endParaRPr sz="4000" b="1" dirty="0">
               <a:solidFill>
@@ -27090,7 +27811,7 @@
                   <a:srgbClr val="E46102"/>
                 </a:solidFill>
               </a:rPr>
-              <a:t>Build a model - 2</a:t>
+              <a:t>Model Performance</a:t>
             </a:r>
             <a:endParaRPr sz="4000" b="1" dirty="0">
               <a:solidFill>
@@ -27114,8 +27835,8 @@
         </p:nvSpPr>
         <p:spPr>
           <a:xfrm>
-            <a:off x="495646" y="2956357"/>
-            <a:ext cx="5776913" cy="1323439"/>
+            <a:off x="1039091" y="2486156"/>
+            <a:ext cx="5233468" cy="2308324"/>
           </a:xfrm>
           <a:prstGeom prst="rect">
             <a:avLst/>
@@ -27129,83 +27850,83 @@
           <a:lstStyle/>
           <a:p>
             <a:r>
-              <a:rPr lang="en-US" sz="2000" i="1" dirty="0"/>
+              <a:rPr lang="en-US" i="1" dirty="0"/>
               <a:t>h</a:t>
             </a:r>
             <a:r>
-              <a:rPr lang="en-US" sz="2000" dirty="0"/>
+              <a:rPr lang="en-US" dirty="0"/>
               <a:t> is your system’s prediction function, also called a </a:t>
             </a:r>
             <a:r>
-              <a:rPr lang="en-US" sz="2000" i="1" dirty="0"/>
+              <a:rPr lang="en-US" i="1" dirty="0"/>
               <a:t>hypothesis</a:t>
             </a:r>
             <a:r>
-              <a:rPr lang="en-US" sz="2000" dirty="0"/>
+              <a:rPr lang="en-US" dirty="0"/>
               <a:t>. When your system is given an instance’s feature vector </a:t>
             </a:r>
             <a:r>
-              <a:rPr lang="en-US" sz="2000" b="1" dirty="0"/>
+              <a:rPr lang="en-US" b="1" dirty="0"/>
               <a:t>x</a:t>
             </a:r>
             <a:r>
-              <a:rPr lang="en-US" sz="2000" i="1" baseline="30000" dirty="0"/>
+              <a:rPr lang="en-US" i="1" baseline="30000" dirty="0"/>
               <a:t>(</a:t>
             </a:r>
             <a:r>
-              <a:rPr lang="en-US" sz="2000" i="1" baseline="30000" dirty="0" err="1"/>
+              <a:rPr lang="en-US" i="1" baseline="30000" dirty="0" err="1"/>
               <a:t>i</a:t>
             </a:r>
             <a:r>
-              <a:rPr lang="en-US" sz="2000" i="1" baseline="30000" dirty="0"/>
+              <a:rPr lang="en-US" i="1" baseline="30000" dirty="0"/>
               <a:t>)</a:t>
             </a:r>
             <a:r>
-              <a:rPr lang="en-US" sz="2000" dirty="0"/>
+              <a:rPr lang="en-US" dirty="0"/>
               <a:t>, it outputs a predicted value </a:t>
             </a:r>
             <a:r>
-              <a:rPr lang="en-US" sz="2000" i="1" dirty="0"/>
+              <a:rPr lang="en-US" i="1" dirty="0"/>
               <a:t>ŷ</a:t>
             </a:r>
             <a:r>
-              <a:rPr lang="en-US" sz="2000" i="1" baseline="30000" dirty="0"/>
+              <a:rPr lang="en-US" i="1" baseline="30000" dirty="0"/>
               <a:t>(</a:t>
             </a:r>
             <a:r>
-              <a:rPr lang="en-US" sz="2000" i="1" baseline="30000" dirty="0" err="1"/>
+              <a:rPr lang="en-US" i="1" baseline="30000" dirty="0" err="1"/>
               <a:t>i</a:t>
             </a:r>
             <a:r>
-              <a:rPr lang="en-US" sz="2000" i="1" baseline="30000" dirty="0"/>
+              <a:rPr lang="en-US" i="1" baseline="30000" dirty="0"/>
               <a:t>)</a:t>
             </a:r>
             <a:r>
-              <a:rPr lang="en-US" sz="2000" i="1" dirty="0"/>
+              <a:rPr lang="en-US" i="1" dirty="0"/>
               <a:t> = h(</a:t>
             </a:r>
             <a:r>
-              <a:rPr lang="en-US" sz="2000" b="1" i="1" dirty="0"/>
+              <a:rPr lang="en-US" b="1" i="1" dirty="0"/>
               <a:t>x</a:t>
             </a:r>
             <a:r>
-              <a:rPr lang="en-US" sz="2000" i="1" baseline="30000" dirty="0"/>
+              <a:rPr lang="en-US" i="1" baseline="30000" dirty="0"/>
               <a:t>(</a:t>
             </a:r>
             <a:r>
-              <a:rPr lang="en-US" sz="2000" i="1" baseline="30000" dirty="0" err="1"/>
+              <a:rPr lang="en-US" i="1" baseline="30000" dirty="0" err="1"/>
               <a:t>i</a:t>
             </a:r>
             <a:r>
-              <a:rPr lang="en-US" sz="2000" i="1" baseline="30000" dirty="0"/>
+              <a:rPr lang="en-US" i="1" baseline="30000" dirty="0"/>
               <a:t>)</a:t>
             </a:r>
             <a:r>
-              <a:rPr lang="en-US" sz="2000" i="1" dirty="0"/>
+              <a:rPr lang="en-US" i="1" dirty="0"/>
               <a:t>)</a:t>
             </a:r>
             <a:r>
-              <a:rPr lang="en-US" sz="2000" dirty="0"/>
+              <a:rPr lang="en-US" dirty="0"/>
               <a:t> for that instance</a:t>
             </a:r>
           </a:p>
@@ -27225,7 +27946,7 @@
         </p:nvSpPr>
         <p:spPr>
           <a:xfrm>
-            <a:off x="6241674" y="3419934"/>
+            <a:off x="6241674" y="3498519"/>
             <a:ext cx="647700" cy="283599"/>
           </a:xfrm>
           <a:prstGeom prst="rightArrow">
@@ -27269,8 +27990,8 @@
         </p:nvSpPr>
         <p:spPr>
           <a:xfrm>
-            <a:off x="7048846" y="2856345"/>
-            <a:ext cx="4641127" cy="1631216"/>
+            <a:off x="7048846" y="2670822"/>
+            <a:ext cx="4641127" cy="1938992"/>
           </a:xfrm>
           <a:prstGeom prst="rect">
             <a:avLst/>
@@ -27284,90 +28005,90 @@
           <a:lstStyle/>
           <a:p>
             <a:r>
-              <a:rPr lang="en-US" sz="2000" dirty="0"/>
+              <a:rPr lang="en-US" dirty="0"/>
               <a:t>If your system predicts that the median housing price in the first district is $158,400, then </a:t>
             </a:r>
           </a:p>
           <a:p>
             <a:r>
-              <a:rPr lang="en-US" sz="2000" i="1" dirty="0"/>
+              <a:rPr lang="en-US" i="1" dirty="0"/>
               <a:t>ŷ</a:t>
             </a:r>
             <a:r>
-              <a:rPr lang="en-US" sz="2000" i="1" baseline="30000" dirty="0"/>
+              <a:rPr lang="en-US" i="1" baseline="30000" dirty="0"/>
               <a:t>(</a:t>
             </a:r>
             <a:r>
-              <a:rPr lang="en-US" sz="2000" i="1" baseline="30000" dirty="0" err="1"/>
+              <a:rPr lang="en-US" i="1" baseline="30000" dirty="0" err="1"/>
               <a:t>i</a:t>
             </a:r>
             <a:r>
-              <a:rPr lang="en-US" sz="2000" i="1" baseline="30000" dirty="0"/>
+              <a:rPr lang="en-US" i="1" baseline="30000" dirty="0"/>
               <a:t>)</a:t>
             </a:r>
             <a:r>
-              <a:rPr lang="en-US" sz="2000" i="1" dirty="0"/>
+              <a:rPr lang="en-US" i="1" dirty="0"/>
               <a:t> = h(</a:t>
             </a:r>
             <a:r>
-              <a:rPr lang="en-US" sz="2000" b="1" i="1" dirty="0"/>
+              <a:rPr lang="en-US" b="1" i="1" dirty="0"/>
               <a:t>x</a:t>
             </a:r>
             <a:r>
-              <a:rPr lang="en-US" sz="2000" i="1" baseline="30000" dirty="0"/>
+              <a:rPr lang="en-US" i="1" baseline="30000" dirty="0"/>
               <a:t>(</a:t>
             </a:r>
             <a:r>
-              <a:rPr lang="en-US" sz="2000" i="1" baseline="30000" dirty="0" err="1"/>
+              <a:rPr lang="en-US" i="1" baseline="30000" dirty="0" err="1"/>
               <a:t>i</a:t>
             </a:r>
             <a:r>
-              <a:rPr lang="en-US" sz="2000" i="1" baseline="30000" dirty="0"/>
+              <a:rPr lang="en-US" i="1" baseline="30000" dirty="0"/>
               <a:t>)</a:t>
             </a:r>
             <a:r>
-              <a:rPr lang="en-US" sz="2000" i="1" dirty="0"/>
+              <a:rPr lang="en-US" i="1" dirty="0"/>
               <a:t>) =&gt; $158,400</a:t>
             </a:r>
           </a:p>
           <a:p>
             <a:r>
-              <a:rPr lang="en-US" sz="2000" i="1" dirty="0"/>
+              <a:rPr lang="en-US" i="1" dirty="0"/>
               <a:t>Prediction rate: ŷ</a:t>
             </a:r>
             <a:r>
-              <a:rPr lang="en-US" sz="2000" i="1" baseline="30000" dirty="0"/>
+              <a:rPr lang="en-US" i="1" baseline="30000" dirty="0"/>
               <a:t>(</a:t>
             </a:r>
             <a:r>
-              <a:rPr lang="en-US" sz="2000" i="1" baseline="30000" dirty="0" err="1"/>
+              <a:rPr lang="en-US" i="1" baseline="30000" dirty="0" err="1"/>
               <a:t>i</a:t>
             </a:r>
             <a:r>
-              <a:rPr lang="en-US" sz="2000" i="1" baseline="30000" dirty="0"/>
+              <a:rPr lang="en-US" i="1" baseline="30000" dirty="0"/>
               <a:t>)</a:t>
             </a:r>
             <a:r>
-              <a:rPr lang="en-US" sz="2000" i="1" dirty="0"/>
+              <a:rPr lang="en-US" i="1" dirty="0"/>
               <a:t> -y</a:t>
             </a:r>
             <a:r>
-              <a:rPr lang="en-US" sz="2000" i="1" baseline="30000" dirty="0"/>
+              <a:rPr lang="en-US" i="1" baseline="30000" dirty="0"/>
               <a:t>(</a:t>
             </a:r>
             <a:r>
-              <a:rPr lang="en-US" sz="2000" i="1" baseline="30000" dirty="0" err="1"/>
+              <a:rPr lang="en-US" i="1" baseline="30000" dirty="0" err="1"/>
               <a:t>i</a:t>
             </a:r>
             <a:r>
-              <a:rPr lang="en-US" sz="2000" i="1" baseline="30000" dirty="0"/>
+              <a:rPr lang="en-US" i="1" baseline="30000" dirty="0"/>
               <a:t>)</a:t>
             </a:r>
             <a:r>
-              <a:rPr lang="en-US" sz="2000" i="1" dirty="0"/>
+              <a:rPr lang="en-US" i="1" dirty="0"/>
               <a:t> = $2,000</a:t>
             </a:r>
-            <a:endParaRPr lang="en-US" sz="2000" dirty="0"/>
+            <a:endParaRPr lang="en-US" dirty="0"/>
           </a:p>
         </p:txBody>
       </p:sp>

</xml_diff>